<commit_message>
added graphs of n. commits
</commit_message>
<xml_diff>
--- a/Paper/EIP Flow Chart.pptx
+++ b/Paper/EIP Flow Chart.pptx
@@ -6,7 +6,6 @@
   </p:sldMasterIdLst>
   <p:sldIdLst>
     <p:sldId id="257" r:id="rId2"/>
-    <p:sldId id="258" r:id="rId3"/>
   </p:sldIdLst>
   <p:sldSz cx="12192000" cy="6858000"/>
   <p:notesSz cx="6858000" cy="9144000"/>
@@ -105,2915 +104,12 @@
       </a:defRPr>
     </a:lvl9pPr>
   </p:defaultTextStyle>
+  <p:extLst>
+    <p:ext uri="{EFAFB233-063F-42B5-8137-9DF3F51BA10A}">
+      <p15:sldGuideLst xmlns:p15="http://schemas.microsoft.com/office/powerpoint/2012/main"/>
+    </p:ext>
+  </p:extLst>
 </p:presentation>
-</file>
-
-<file path=ppt/diagrams/colors1.xml><?xml version="1.0" encoding="utf-8"?>
-<dgm:colorsDef xmlns:dgm="http://schemas.openxmlformats.org/drawingml/2006/diagram" xmlns:a="http://schemas.openxmlformats.org/drawingml/2006/main" uniqueId="urn:microsoft.com/office/officeart/2005/8/colors/accent1_2">
-  <dgm:title val=""/>
-  <dgm:desc val=""/>
-  <dgm:catLst>
-    <dgm:cat type="accent1" pri="11200"/>
-  </dgm:catLst>
-  <dgm:styleLbl name="node0">
-    <dgm:fillClrLst meth="repeat">
-      <a:schemeClr val="accent1"/>
-    </dgm:fillClrLst>
-    <dgm:linClrLst meth="repeat">
-      <a:schemeClr val="lt1"/>
-    </dgm:linClrLst>
-    <dgm:effectClrLst/>
-    <dgm:txLinClrLst/>
-    <dgm:txFillClrLst/>
-    <dgm:txEffectClrLst/>
-  </dgm:styleLbl>
-  <dgm:styleLbl name="alignNode1">
-    <dgm:fillClrLst meth="repeat">
-      <a:schemeClr val="accent1"/>
-    </dgm:fillClrLst>
-    <dgm:linClrLst meth="repeat">
-      <a:schemeClr val="accent1"/>
-    </dgm:linClrLst>
-    <dgm:effectClrLst/>
-    <dgm:txLinClrLst/>
-    <dgm:txFillClrLst/>
-    <dgm:txEffectClrLst/>
-  </dgm:styleLbl>
-  <dgm:styleLbl name="node1">
-    <dgm:fillClrLst meth="repeat">
-      <a:schemeClr val="accent1"/>
-    </dgm:fillClrLst>
-    <dgm:linClrLst meth="repeat">
-      <a:schemeClr val="lt1"/>
-    </dgm:linClrLst>
-    <dgm:effectClrLst/>
-    <dgm:txLinClrLst/>
-    <dgm:txFillClrLst/>
-    <dgm:txEffectClrLst/>
-  </dgm:styleLbl>
-  <dgm:styleLbl name="lnNode1">
-    <dgm:fillClrLst meth="repeat">
-      <a:schemeClr val="accent1"/>
-    </dgm:fillClrLst>
-    <dgm:linClrLst meth="repeat">
-      <a:schemeClr val="lt1"/>
-    </dgm:linClrLst>
-    <dgm:effectClrLst/>
-    <dgm:txLinClrLst/>
-    <dgm:txFillClrLst/>
-    <dgm:txEffectClrLst/>
-  </dgm:styleLbl>
-  <dgm:styleLbl name="vennNode1">
-    <dgm:fillClrLst meth="repeat">
-      <a:schemeClr val="accent1">
-        <a:alpha val="50000"/>
-      </a:schemeClr>
-    </dgm:fillClrLst>
-    <dgm:linClrLst meth="repeat">
-      <a:schemeClr val="lt1"/>
-    </dgm:linClrLst>
-    <dgm:effectClrLst/>
-    <dgm:txLinClrLst/>
-    <dgm:txFillClrLst/>
-    <dgm:txEffectClrLst/>
-  </dgm:styleLbl>
-  <dgm:styleLbl name="node2">
-    <dgm:fillClrLst meth="repeat">
-      <a:schemeClr val="accent1"/>
-    </dgm:fillClrLst>
-    <dgm:linClrLst meth="repeat">
-      <a:schemeClr val="lt1"/>
-    </dgm:linClrLst>
-    <dgm:effectClrLst/>
-    <dgm:txLinClrLst/>
-    <dgm:txFillClrLst/>
-    <dgm:txEffectClrLst/>
-  </dgm:styleLbl>
-  <dgm:styleLbl name="node3">
-    <dgm:fillClrLst meth="repeat">
-      <a:schemeClr val="accent1"/>
-    </dgm:fillClrLst>
-    <dgm:linClrLst meth="repeat">
-      <a:schemeClr val="lt1"/>
-    </dgm:linClrLst>
-    <dgm:effectClrLst/>
-    <dgm:txLinClrLst/>
-    <dgm:txFillClrLst/>
-    <dgm:txEffectClrLst/>
-  </dgm:styleLbl>
-  <dgm:styleLbl name="node4">
-    <dgm:fillClrLst meth="repeat">
-      <a:schemeClr val="accent1"/>
-    </dgm:fillClrLst>
-    <dgm:linClrLst meth="repeat">
-      <a:schemeClr val="lt1"/>
-    </dgm:linClrLst>
-    <dgm:effectClrLst/>
-    <dgm:txLinClrLst/>
-    <dgm:txFillClrLst/>
-    <dgm:txEffectClrLst/>
-  </dgm:styleLbl>
-  <dgm:styleLbl name="fgImgPlace1">
-    <dgm:fillClrLst meth="repeat">
-      <a:schemeClr val="accent1">
-        <a:tint val="50000"/>
-      </a:schemeClr>
-    </dgm:fillClrLst>
-    <dgm:linClrLst meth="repeat">
-      <a:schemeClr val="lt1"/>
-    </dgm:linClrLst>
-    <dgm:effectClrLst/>
-    <dgm:txLinClrLst/>
-    <dgm:txFillClrLst meth="repeat">
-      <a:schemeClr val="lt1"/>
-    </dgm:txFillClrLst>
-    <dgm:txEffectClrLst/>
-  </dgm:styleLbl>
-  <dgm:styleLbl name="alignImgPlace1">
-    <dgm:fillClrLst meth="repeat">
-      <a:schemeClr val="accent1">
-        <a:tint val="50000"/>
-      </a:schemeClr>
-    </dgm:fillClrLst>
-    <dgm:linClrLst meth="repeat">
-      <a:schemeClr val="lt1"/>
-    </dgm:linClrLst>
-    <dgm:effectClrLst/>
-    <dgm:txLinClrLst/>
-    <dgm:txFillClrLst meth="repeat">
-      <a:schemeClr val="lt1"/>
-    </dgm:txFillClrLst>
-    <dgm:txEffectClrLst/>
-  </dgm:styleLbl>
-  <dgm:styleLbl name="bgImgPlace1">
-    <dgm:fillClrLst meth="repeat">
-      <a:schemeClr val="accent1">
-        <a:tint val="50000"/>
-      </a:schemeClr>
-    </dgm:fillClrLst>
-    <dgm:linClrLst meth="repeat">
-      <a:schemeClr val="lt1"/>
-    </dgm:linClrLst>
-    <dgm:effectClrLst/>
-    <dgm:txLinClrLst/>
-    <dgm:txFillClrLst meth="repeat">
-      <a:schemeClr val="lt1"/>
-    </dgm:txFillClrLst>
-    <dgm:txEffectClrLst/>
-  </dgm:styleLbl>
-  <dgm:styleLbl name="sibTrans2D1">
-    <dgm:fillClrLst meth="repeat">
-      <a:schemeClr val="accent1">
-        <a:tint val="60000"/>
-      </a:schemeClr>
-    </dgm:fillClrLst>
-    <dgm:linClrLst meth="repeat">
-      <a:schemeClr val="accent1">
-        <a:tint val="60000"/>
-      </a:schemeClr>
-    </dgm:linClrLst>
-    <dgm:effectClrLst/>
-    <dgm:txLinClrLst/>
-    <dgm:txFillClrLst/>
-    <dgm:txEffectClrLst/>
-  </dgm:styleLbl>
-  <dgm:styleLbl name="fgSibTrans2D1">
-    <dgm:fillClrLst meth="repeat">
-      <a:schemeClr val="accent1">
-        <a:tint val="60000"/>
-      </a:schemeClr>
-    </dgm:fillClrLst>
-    <dgm:linClrLst meth="repeat">
-      <a:schemeClr val="accent1">
-        <a:tint val="60000"/>
-      </a:schemeClr>
-    </dgm:linClrLst>
-    <dgm:effectClrLst/>
-    <dgm:txLinClrLst/>
-    <dgm:txFillClrLst/>
-    <dgm:txEffectClrLst/>
-  </dgm:styleLbl>
-  <dgm:styleLbl name="bgSibTrans2D1">
-    <dgm:fillClrLst meth="repeat">
-      <a:schemeClr val="accent1">
-        <a:tint val="60000"/>
-      </a:schemeClr>
-    </dgm:fillClrLst>
-    <dgm:linClrLst meth="repeat">
-      <a:schemeClr val="accent1">
-        <a:tint val="60000"/>
-      </a:schemeClr>
-    </dgm:linClrLst>
-    <dgm:effectClrLst/>
-    <dgm:txLinClrLst/>
-    <dgm:txFillClrLst/>
-    <dgm:txEffectClrLst/>
-  </dgm:styleLbl>
-  <dgm:styleLbl name="sibTrans1D1">
-    <dgm:fillClrLst meth="repeat">
-      <a:schemeClr val="accent1"/>
-    </dgm:fillClrLst>
-    <dgm:linClrLst meth="repeat">
-      <a:schemeClr val="accent1"/>
-    </dgm:linClrLst>
-    <dgm:effectClrLst/>
-    <dgm:txLinClrLst/>
-    <dgm:txFillClrLst meth="repeat">
-      <a:schemeClr val="tx1"/>
-    </dgm:txFillClrLst>
-    <dgm:txEffectClrLst/>
-  </dgm:styleLbl>
-  <dgm:styleLbl name="callout">
-    <dgm:fillClrLst meth="repeat">
-      <a:schemeClr val="accent1"/>
-    </dgm:fillClrLst>
-    <dgm:linClrLst meth="repeat">
-      <a:schemeClr val="accent1">
-        <a:tint val="50000"/>
-      </a:schemeClr>
-    </dgm:linClrLst>
-    <dgm:effectClrLst/>
-    <dgm:txLinClrLst/>
-    <dgm:txFillClrLst meth="repeat">
-      <a:schemeClr val="tx1"/>
-    </dgm:txFillClrLst>
-    <dgm:txEffectClrLst/>
-  </dgm:styleLbl>
-  <dgm:styleLbl name="asst0">
-    <dgm:fillClrLst meth="repeat">
-      <a:schemeClr val="accent1"/>
-    </dgm:fillClrLst>
-    <dgm:linClrLst meth="repeat">
-      <a:schemeClr val="lt1"/>
-    </dgm:linClrLst>
-    <dgm:effectClrLst/>
-    <dgm:txLinClrLst/>
-    <dgm:txFillClrLst/>
-    <dgm:txEffectClrLst/>
-  </dgm:styleLbl>
-  <dgm:styleLbl name="asst1">
-    <dgm:fillClrLst meth="repeat">
-      <a:schemeClr val="accent1"/>
-    </dgm:fillClrLst>
-    <dgm:linClrLst meth="repeat">
-      <a:schemeClr val="lt1"/>
-    </dgm:linClrLst>
-    <dgm:effectClrLst/>
-    <dgm:txLinClrLst/>
-    <dgm:txFillClrLst/>
-    <dgm:txEffectClrLst/>
-  </dgm:styleLbl>
-  <dgm:styleLbl name="asst2">
-    <dgm:fillClrLst meth="repeat">
-      <a:schemeClr val="accent1"/>
-    </dgm:fillClrLst>
-    <dgm:linClrLst meth="repeat">
-      <a:schemeClr val="lt1"/>
-    </dgm:linClrLst>
-    <dgm:effectClrLst/>
-    <dgm:txLinClrLst/>
-    <dgm:txFillClrLst/>
-    <dgm:txEffectClrLst/>
-  </dgm:styleLbl>
-  <dgm:styleLbl name="asst3">
-    <dgm:fillClrLst meth="repeat">
-      <a:schemeClr val="accent1"/>
-    </dgm:fillClrLst>
-    <dgm:linClrLst meth="repeat">
-      <a:schemeClr val="lt1"/>
-    </dgm:linClrLst>
-    <dgm:effectClrLst/>
-    <dgm:txLinClrLst/>
-    <dgm:txFillClrLst/>
-    <dgm:txEffectClrLst/>
-  </dgm:styleLbl>
-  <dgm:styleLbl name="asst4">
-    <dgm:fillClrLst meth="repeat">
-      <a:schemeClr val="accent1"/>
-    </dgm:fillClrLst>
-    <dgm:linClrLst meth="repeat">
-      <a:schemeClr val="lt1"/>
-    </dgm:linClrLst>
-    <dgm:effectClrLst/>
-    <dgm:txLinClrLst/>
-    <dgm:txFillClrLst/>
-    <dgm:txEffectClrLst/>
-  </dgm:styleLbl>
-  <dgm:styleLbl name="parChTrans2D1">
-    <dgm:fillClrLst meth="repeat">
-      <a:schemeClr val="accent1">
-        <a:tint val="60000"/>
-      </a:schemeClr>
-    </dgm:fillClrLst>
-    <dgm:linClrLst meth="repeat">
-      <a:schemeClr val="accent1">
-        <a:tint val="60000"/>
-      </a:schemeClr>
-    </dgm:linClrLst>
-    <dgm:effectClrLst/>
-    <dgm:txLinClrLst/>
-    <dgm:txFillClrLst meth="repeat">
-      <a:schemeClr val="lt1"/>
-    </dgm:txFillClrLst>
-    <dgm:txEffectClrLst/>
-  </dgm:styleLbl>
-  <dgm:styleLbl name="parChTrans2D2">
-    <dgm:fillClrLst meth="repeat">
-      <a:schemeClr val="accent1"/>
-    </dgm:fillClrLst>
-    <dgm:linClrLst meth="repeat">
-      <a:schemeClr val="accent1"/>
-    </dgm:linClrLst>
-    <dgm:effectClrLst/>
-    <dgm:txLinClrLst/>
-    <dgm:txFillClrLst meth="repeat">
-      <a:schemeClr val="lt1"/>
-    </dgm:txFillClrLst>
-    <dgm:txEffectClrLst/>
-  </dgm:styleLbl>
-  <dgm:styleLbl name="parChTrans2D3">
-    <dgm:fillClrLst meth="repeat">
-      <a:schemeClr val="accent1"/>
-    </dgm:fillClrLst>
-    <dgm:linClrLst meth="repeat">
-      <a:schemeClr val="accent1"/>
-    </dgm:linClrLst>
-    <dgm:effectClrLst/>
-    <dgm:txLinClrLst/>
-    <dgm:txFillClrLst meth="repeat">
-      <a:schemeClr val="lt1"/>
-    </dgm:txFillClrLst>
-    <dgm:txEffectClrLst/>
-  </dgm:styleLbl>
-  <dgm:styleLbl name="parChTrans2D4">
-    <dgm:fillClrLst meth="repeat">
-      <a:schemeClr val="accent1"/>
-    </dgm:fillClrLst>
-    <dgm:linClrLst meth="repeat">
-      <a:schemeClr val="accent1"/>
-    </dgm:linClrLst>
-    <dgm:effectClrLst/>
-    <dgm:txLinClrLst/>
-    <dgm:txFillClrLst meth="repeat">
-      <a:schemeClr val="lt1"/>
-    </dgm:txFillClrLst>
-    <dgm:txEffectClrLst/>
-  </dgm:styleLbl>
-  <dgm:styleLbl name="parChTrans1D1">
-    <dgm:fillClrLst meth="repeat">
-      <a:schemeClr val="accent1"/>
-    </dgm:fillClrLst>
-    <dgm:linClrLst meth="repeat">
-      <a:schemeClr val="accent1">
-        <a:shade val="60000"/>
-      </a:schemeClr>
-    </dgm:linClrLst>
-    <dgm:effectClrLst/>
-    <dgm:txLinClrLst/>
-    <dgm:txFillClrLst meth="repeat">
-      <a:schemeClr val="tx1"/>
-    </dgm:txFillClrLst>
-    <dgm:txEffectClrLst/>
-  </dgm:styleLbl>
-  <dgm:styleLbl name="parChTrans1D2">
-    <dgm:fillClrLst meth="repeat">
-      <a:schemeClr val="accent1"/>
-    </dgm:fillClrLst>
-    <dgm:linClrLst meth="repeat">
-      <a:schemeClr val="accent1">
-        <a:shade val="60000"/>
-      </a:schemeClr>
-    </dgm:linClrLst>
-    <dgm:effectClrLst/>
-    <dgm:txLinClrLst/>
-    <dgm:txFillClrLst meth="repeat">
-      <a:schemeClr val="tx1"/>
-    </dgm:txFillClrLst>
-    <dgm:txEffectClrLst/>
-  </dgm:styleLbl>
-  <dgm:styleLbl name="parChTrans1D3">
-    <dgm:fillClrLst meth="repeat">
-      <a:schemeClr val="accent1"/>
-    </dgm:fillClrLst>
-    <dgm:linClrLst meth="repeat">
-      <a:schemeClr val="accent1">
-        <a:shade val="80000"/>
-      </a:schemeClr>
-    </dgm:linClrLst>
-    <dgm:effectClrLst/>
-    <dgm:txLinClrLst/>
-    <dgm:txFillClrLst meth="repeat">
-      <a:schemeClr val="tx1"/>
-    </dgm:txFillClrLst>
-    <dgm:txEffectClrLst/>
-  </dgm:styleLbl>
-  <dgm:styleLbl name="parChTrans1D4">
-    <dgm:fillClrLst meth="repeat">
-      <a:schemeClr val="accent1"/>
-    </dgm:fillClrLst>
-    <dgm:linClrLst meth="repeat">
-      <a:schemeClr val="accent1">
-        <a:shade val="80000"/>
-      </a:schemeClr>
-    </dgm:linClrLst>
-    <dgm:effectClrLst/>
-    <dgm:txLinClrLst/>
-    <dgm:txFillClrLst meth="repeat">
-      <a:schemeClr val="tx1"/>
-    </dgm:txFillClrLst>
-    <dgm:txEffectClrLst/>
-  </dgm:styleLbl>
-  <dgm:styleLbl name="fgAcc1">
-    <dgm:fillClrLst meth="repeat">
-      <a:schemeClr val="lt1">
-        <a:alpha val="90000"/>
-      </a:schemeClr>
-    </dgm:fillClrLst>
-    <dgm:linClrLst meth="repeat">
-      <a:schemeClr val="accent1"/>
-    </dgm:linClrLst>
-    <dgm:effectClrLst/>
-    <dgm:txLinClrLst/>
-    <dgm:txFillClrLst meth="repeat">
-      <a:schemeClr val="dk1"/>
-    </dgm:txFillClrLst>
-    <dgm:txEffectClrLst/>
-  </dgm:styleLbl>
-  <dgm:styleLbl name="conFgAcc1">
-    <dgm:fillClrLst meth="repeat">
-      <a:schemeClr val="lt1">
-        <a:alpha val="90000"/>
-      </a:schemeClr>
-    </dgm:fillClrLst>
-    <dgm:linClrLst meth="repeat">
-      <a:schemeClr val="accent1"/>
-    </dgm:linClrLst>
-    <dgm:effectClrLst/>
-    <dgm:txLinClrLst/>
-    <dgm:txFillClrLst meth="repeat">
-      <a:schemeClr val="dk1"/>
-    </dgm:txFillClrLst>
-    <dgm:txEffectClrLst/>
-  </dgm:styleLbl>
-  <dgm:styleLbl name="alignAcc1">
-    <dgm:fillClrLst meth="repeat">
-      <a:schemeClr val="lt1">
-        <a:alpha val="90000"/>
-      </a:schemeClr>
-    </dgm:fillClrLst>
-    <dgm:linClrLst meth="repeat">
-      <a:schemeClr val="accent1"/>
-    </dgm:linClrLst>
-    <dgm:effectClrLst/>
-    <dgm:txLinClrLst/>
-    <dgm:txFillClrLst meth="repeat">
-      <a:schemeClr val="dk1"/>
-    </dgm:txFillClrLst>
-    <dgm:txEffectClrLst/>
-  </dgm:styleLbl>
-  <dgm:styleLbl name="trAlignAcc1">
-    <dgm:fillClrLst meth="repeat">
-      <a:schemeClr val="lt1">
-        <a:alpha val="40000"/>
-      </a:schemeClr>
-    </dgm:fillClrLst>
-    <dgm:linClrLst meth="repeat">
-      <a:schemeClr val="accent1"/>
-    </dgm:linClrLst>
-    <dgm:effectClrLst/>
-    <dgm:txLinClrLst/>
-    <dgm:txFillClrLst meth="repeat">
-      <a:schemeClr val="dk1"/>
-    </dgm:txFillClrLst>
-    <dgm:txEffectClrLst/>
-  </dgm:styleLbl>
-  <dgm:styleLbl name="bgAcc1">
-    <dgm:fillClrLst meth="repeat">
-      <a:schemeClr val="lt1">
-        <a:alpha val="90000"/>
-      </a:schemeClr>
-    </dgm:fillClrLst>
-    <dgm:linClrLst meth="repeat">
-      <a:schemeClr val="accent1"/>
-    </dgm:linClrLst>
-    <dgm:effectClrLst/>
-    <dgm:txLinClrLst/>
-    <dgm:txFillClrLst meth="repeat">
-      <a:schemeClr val="dk1"/>
-    </dgm:txFillClrLst>
-    <dgm:txEffectClrLst/>
-  </dgm:styleLbl>
-  <dgm:styleLbl name="solidFgAcc1">
-    <dgm:fillClrLst meth="repeat">
-      <a:schemeClr val="lt1"/>
-    </dgm:fillClrLst>
-    <dgm:linClrLst meth="repeat">
-      <a:schemeClr val="accent1"/>
-    </dgm:linClrLst>
-    <dgm:effectClrLst/>
-    <dgm:txLinClrLst/>
-    <dgm:txFillClrLst meth="repeat">
-      <a:schemeClr val="dk1"/>
-    </dgm:txFillClrLst>
-    <dgm:txEffectClrLst/>
-  </dgm:styleLbl>
-  <dgm:styleLbl name="solidAlignAcc1">
-    <dgm:fillClrLst meth="repeat">
-      <a:schemeClr val="lt1"/>
-    </dgm:fillClrLst>
-    <dgm:linClrLst meth="repeat">
-      <a:schemeClr val="accent1"/>
-    </dgm:linClrLst>
-    <dgm:effectClrLst/>
-    <dgm:txLinClrLst/>
-    <dgm:txFillClrLst meth="repeat">
-      <a:schemeClr val="dk1"/>
-    </dgm:txFillClrLst>
-    <dgm:txEffectClrLst/>
-  </dgm:styleLbl>
-  <dgm:styleLbl name="solidBgAcc1">
-    <dgm:fillClrLst meth="repeat">
-      <a:schemeClr val="lt1"/>
-    </dgm:fillClrLst>
-    <dgm:linClrLst meth="repeat">
-      <a:schemeClr val="accent1"/>
-    </dgm:linClrLst>
-    <dgm:effectClrLst/>
-    <dgm:txLinClrLst/>
-    <dgm:txFillClrLst meth="repeat">
-      <a:schemeClr val="dk1"/>
-    </dgm:txFillClrLst>
-    <dgm:txEffectClrLst/>
-  </dgm:styleLbl>
-  <dgm:styleLbl name="fgAccFollowNode1">
-    <dgm:fillClrLst meth="repeat">
-      <a:schemeClr val="accent1">
-        <a:alpha val="90000"/>
-        <a:tint val="40000"/>
-      </a:schemeClr>
-    </dgm:fillClrLst>
-    <dgm:linClrLst meth="repeat">
-      <a:schemeClr val="accent1">
-        <a:alpha val="90000"/>
-        <a:tint val="40000"/>
-      </a:schemeClr>
-    </dgm:linClrLst>
-    <dgm:effectClrLst/>
-    <dgm:txLinClrLst/>
-    <dgm:txFillClrLst meth="repeat">
-      <a:schemeClr val="dk1"/>
-    </dgm:txFillClrLst>
-    <dgm:txEffectClrLst/>
-  </dgm:styleLbl>
-  <dgm:styleLbl name="alignAccFollowNode1">
-    <dgm:fillClrLst meth="repeat">
-      <a:schemeClr val="accent1">
-        <a:alpha val="90000"/>
-        <a:tint val="40000"/>
-      </a:schemeClr>
-    </dgm:fillClrLst>
-    <dgm:linClrLst meth="repeat">
-      <a:schemeClr val="accent1">
-        <a:alpha val="90000"/>
-        <a:tint val="40000"/>
-      </a:schemeClr>
-    </dgm:linClrLst>
-    <dgm:effectClrLst/>
-    <dgm:txLinClrLst/>
-    <dgm:txFillClrLst meth="repeat">
-      <a:schemeClr val="dk1"/>
-    </dgm:txFillClrLst>
-    <dgm:txEffectClrLst/>
-  </dgm:styleLbl>
-  <dgm:styleLbl name="bgAccFollowNode1">
-    <dgm:fillClrLst meth="repeat">
-      <a:schemeClr val="accent1">
-        <a:alpha val="90000"/>
-        <a:tint val="40000"/>
-      </a:schemeClr>
-    </dgm:fillClrLst>
-    <dgm:linClrLst meth="repeat">
-      <a:schemeClr val="accent1">
-        <a:alpha val="90000"/>
-        <a:tint val="40000"/>
-      </a:schemeClr>
-    </dgm:linClrLst>
-    <dgm:effectClrLst/>
-    <dgm:txLinClrLst/>
-    <dgm:txFillClrLst meth="repeat">
-      <a:schemeClr val="dk1"/>
-    </dgm:txFillClrLst>
-    <dgm:txEffectClrLst/>
-  </dgm:styleLbl>
-  <dgm:styleLbl name="fgAcc0">
-    <dgm:fillClrLst meth="repeat">
-      <a:schemeClr val="lt1">
-        <a:alpha val="90000"/>
-      </a:schemeClr>
-    </dgm:fillClrLst>
-    <dgm:linClrLst meth="repeat">
-      <a:schemeClr val="accent1"/>
-    </dgm:linClrLst>
-    <dgm:effectClrLst/>
-    <dgm:txLinClrLst/>
-    <dgm:txFillClrLst meth="repeat">
-      <a:schemeClr val="dk1"/>
-    </dgm:txFillClrLst>
-    <dgm:txEffectClrLst/>
-  </dgm:styleLbl>
-  <dgm:styleLbl name="fgAcc2">
-    <dgm:fillClrLst meth="repeat">
-      <a:schemeClr val="lt1">
-        <a:alpha val="90000"/>
-      </a:schemeClr>
-    </dgm:fillClrLst>
-    <dgm:linClrLst meth="repeat">
-      <a:schemeClr val="accent1"/>
-    </dgm:linClrLst>
-    <dgm:effectClrLst/>
-    <dgm:txLinClrLst/>
-    <dgm:txFillClrLst meth="repeat">
-      <a:schemeClr val="dk1"/>
-    </dgm:txFillClrLst>
-    <dgm:txEffectClrLst/>
-  </dgm:styleLbl>
-  <dgm:styleLbl name="fgAcc3">
-    <dgm:fillClrLst meth="repeat">
-      <a:schemeClr val="lt1">
-        <a:alpha val="90000"/>
-      </a:schemeClr>
-    </dgm:fillClrLst>
-    <dgm:linClrLst meth="repeat">
-      <a:schemeClr val="accent1"/>
-    </dgm:linClrLst>
-    <dgm:effectClrLst/>
-    <dgm:txLinClrLst/>
-    <dgm:txFillClrLst meth="repeat">
-      <a:schemeClr val="dk1"/>
-    </dgm:txFillClrLst>
-    <dgm:txEffectClrLst/>
-  </dgm:styleLbl>
-  <dgm:styleLbl name="fgAcc4">
-    <dgm:fillClrLst meth="repeat">
-      <a:schemeClr val="lt1">
-        <a:alpha val="90000"/>
-      </a:schemeClr>
-    </dgm:fillClrLst>
-    <dgm:linClrLst meth="repeat">
-      <a:schemeClr val="accent1"/>
-    </dgm:linClrLst>
-    <dgm:effectClrLst/>
-    <dgm:txLinClrLst/>
-    <dgm:txFillClrLst meth="repeat">
-      <a:schemeClr val="dk1"/>
-    </dgm:txFillClrLst>
-    <dgm:txEffectClrLst/>
-  </dgm:styleLbl>
-  <dgm:styleLbl name="bgShp">
-    <dgm:fillClrLst meth="repeat">
-      <a:schemeClr val="accent1">
-        <a:tint val="40000"/>
-      </a:schemeClr>
-    </dgm:fillClrLst>
-    <dgm:linClrLst meth="repeat">
-      <a:schemeClr val="accent1"/>
-    </dgm:linClrLst>
-    <dgm:effectClrLst/>
-    <dgm:txLinClrLst/>
-    <dgm:txFillClrLst meth="repeat">
-      <a:schemeClr val="dk1"/>
-    </dgm:txFillClrLst>
-    <dgm:txEffectClrLst/>
-  </dgm:styleLbl>
-  <dgm:styleLbl name="dkBgShp">
-    <dgm:fillClrLst meth="repeat">
-      <a:schemeClr val="accent1">
-        <a:shade val="80000"/>
-      </a:schemeClr>
-    </dgm:fillClrLst>
-    <dgm:linClrLst meth="repeat">
-      <a:schemeClr val="accent1"/>
-    </dgm:linClrLst>
-    <dgm:effectClrLst/>
-    <dgm:txLinClrLst/>
-    <dgm:txFillClrLst meth="repeat">
-      <a:schemeClr val="lt1"/>
-    </dgm:txFillClrLst>
-    <dgm:txEffectClrLst/>
-  </dgm:styleLbl>
-  <dgm:styleLbl name="trBgShp">
-    <dgm:fillClrLst meth="repeat">
-      <a:schemeClr val="accent1">
-        <a:tint val="50000"/>
-        <a:alpha val="40000"/>
-      </a:schemeClr>
-    </dgm:fillClrLst>
-    <dgm:linClrLst meth="repeat">
-      <a:schemeClr val="accent1"/>
-    </dgm:linClrLst>
-    <dgm:effectClrLst/>
-    <dgm:txLinClrLst/>
-    <dgm:txFillClrLst meth="repeat">
-      <a:schemeClr val="lt1"/>
-    </dgm:txFillClrLst>
-    <dgm:txEffectClrLst/>
-  </dgm:styleLbl>
-  <dgm:styleLbl name="fgShp">
-    <dgm:fillClrLst meth="repeat">
-      <a:schemeClr val="accent1">
-        <a:tint val="60000"/>
-      </a:schemeClr>
-    </dgm:fillClrLst>
-    <dgm:linClrLst meth="repeat">
-      <a:schemeClr val="lt1"/>
-    </dgm:linClrLst>
-    <dgm:effectClrLst/>
-    <dgm:txLinClrLst/>
-    <dgm:txFillClrLst meth="repeat">
-      <a:schemeClr val="dk1"/>
-    </dgm:txFillClrLst>
-    <dgm:txEffectClrLst/>
-  </dgm:styleLbl>
-  <dgm:styleLbl name="revTx">
-    <dgm:fillClrLst meth="repeat">
-      <a:schemeClr val="lt1">
-        <a:alpha val="0"/>
-      </a:schemeClr>
-    </dgm:fillClrLst>
-    <dgm:linClrLst meth="repeat">
-      <a:schemeClr val="dk1">
-        <a:alpha val="0"/>
-      </a:schemeClr>
-    </dgm:linClrLst>
-    <dgm:effectClrLst/>
-    <dgm:txLinClrLst/>
-    <dgm:txFillClrLst meth="repeat">
-      <a:schemeClr val="tx1"/>
-    </dgm:txFillClrLst>
-    <dgm:txEffectClrLst/>
-  </dgm:styleLbl>
-</dgm:colorsDef>
-</file>
-
-<file path=ppt/diagrams/data1.xml><?xml version="1.0" encoding="utf-8"?>
-<dgm:dataModel xmlns:dgm="http://schemas.openxmlformats.org/drawingml/2006/diagram" xmlns:a="http://schemas.openxmlformats.org/drawingml/2006/main">
-  <dgm:ptLst>
-    <dgm:pt modelId="{3D47EE8F-041D-41B3-B5FE-05D319419F74}" type="doc">
-      <dgm:prSet loTypeId="urn:microsoft.com/office/officeart/2005/8/layout/vList2" loCatId="list" qsTypeId="urn:microsoft.com/office/officeart/2005/8/quickstyle/simple1" qsCatId="simple" csTypeId="urn:microsoft.com/office/officeart/2005/8/colors/accent1_2" csCatId="accent1" phldr="1"/>
-      <dgm:spPr/>
-      <dgm:t>
-        <a:bodyPr/>
-        <a:lstStyle/>
-        <a:p>
-          <a:endParaRPr lang="en-US"/>
-        </a:p>
-      </dgm:t>
-    </dgm:pt>
-    <dgm:pt modelId="{A1DE696C-8BBD-4681-9895-8D682CC6003E}">
-      <dgm:prSet phldrT="[Text]"/>
-      <dgm:spPr/>
-      <dgm:t>
-        <a:bodyPr/>
-        <a:lstStyle/>
-        <a:p>
-          <a:r>
-            <a:rPr lang="en-US"/>
-            <a:t>End-users</a:t>
-          </a:r>
-          <a:endParaRPr lang="en-US" dirty="0"/>
-        </a:p>
-      </dgm:t>
-    </dgm:pt>
-    <dgm:pt modelId="{F366A476-8853-437F-ACA0-912E4CE6837C}" type="parTrans" cxnId="{03074898-20FA-4489-9902-3BF898ED2D95}">
-      <dgm:prSet/>
-      <dgm:spPr/>
-      <dgm:t>
-        <a:bodyPr/>
-        <a:lstStyle/>
-        <a:p>
-          <a:endParaRPr lang="en-US"/>
-        </a:p>
-      </dgm:t>
-    </dgm:pt>
-    <dgm:pt modelId="{8573D246-7A5B-4136-9351-D95660AADB26}" type="sibTrans" cxnId="{03074898-20FA-4489-9902-3BF898ED2D95}">
-      <dgm:prSet/>
-      <dgm:spPr/>
-      <dgm:t>
-        <a:bodyPr/>
-        <a:lstStyle/>
-        <a:p>
-          <a:endParaRPr lang="en-US"/>
-        </a:p>
-      </dgm:t>
-    </dgm:pt>
-    <dgm:pt modelId="{3A841049-5F75-48A8-AF3A-1AB392632C03}">
-      <dgm:prSet phldrT="[Text]"/>
-      <dgm:spPr/>
-      <dgm:t>
-        <a:bodyPr/>
-        <a:lstStyle/>
-        <a:p>
-          <a:r>
-            <a:rPr lang="en-US" dirty="0"/>
-            <a:t>Wallet holders</a:t>
-          </a:r>
-        </a:p>
-      </dgm:t>
-    </dgm:pt>
-    <dgm:pt modelId="{DF1BA6EF-EC25-451C-A9F9-947562CB76CE}" type="parTrans" cxnId="{A4B557D0-4E1B-408C-A9D9-03AD1BD7CE69}">
-      <dgm:prSet/>
-      <dgm:spPr/>
-      <dgm:t>
-        <a:bodyPr/>
-        <a:lstStyle/>
-        <a:p>
-          <a:endParaRPr lang="en-US"/>
-        </a:p>
-      </dgm:t>
-    </dgm:pt>
-    <dgm:pt modelId="{096D2619-1ECB-4D32-B6E1-34B53380FC65}" type="sibTrans" cxnId="{A4B557D0-4E1B-408C-A9D9-03AD1BD7CE69}">
-      <dgm:prSet/>
-      <dgm:spPr/>
-      <dgm:t>
-        <a:bodyPr/>
-        <a:lstStyle/>
-        <a:p>
-          <a:endParaRPr lang="en-US"/>
-        </a:p>
-      </dgm:t>
-    </dgm:pt>
-    <dgm:pt modelId="{47078A50-6C04-4E9A-9963-6C41A96EDB50}">
-      <dgm:prSet phldrT="[Text]"/>
-      <dgm:spPr/>
-      <dgm:t>
-        <a:bodyPr/>
-        <a:lstStyle/>
-        <a:p>
-          <a:r>
-            <a:rPr lang="en-US" dirty="0"/>
-            <a:t>Application </a:t>
-          </a:r>
-          <a:r>
-            <a:rPr lang="en-US" dirty="0" err="1"/>
-            <a:t>Developement</a:t>
-          </a:r>
-          <a:endParaRPr lang="en-US" dirty="0"/>
-        </a:p>
-      </dgm:t>
-    </dgm:pt>
-    <dgm:pt modelId="{4CDB77C6-6095-4AA5-A338-B356F083B4F1}" type="parTrans" cxnId="{FDEE20CD-F742-4B48-8D3D-833C36FE632C}">
-      <dgm:prSet/>
-      <dgm:spPr/>
-      <dgm:t>
-        <a:bodyPr/>
-        <a:lstStyle/>
-        <a:p>
-          <a:endParaRPr lang="en-US"/>
-        </a:p>
-      </dgm:t>
-    </dgm:pt>
-    <dgm:pt modelId="{9B7B157E-7C37-40DB-BD5F-C1A47BF58EE1}" type="sibTrans" cxnId="{FDEE20CD-F742-4B48-8D3D-833C36FE632C}">
-      <dgm:prSet/>
-      <dgm:spPr/>
-      <dgm:t>
-        <a:bodyPr/>
-        <a:lstStyle/>
-        <a:p>
-          <a:endParaRPr lang="en-US"/>
-        </a:p>
-      </dgm:t>
-    </dgm:pt>
-    <dgm:pt modelId="{0C3C4790-D623-4B81-9B73-4DDAFDBCD538}">
-      <dgm:prSet phldrT="[Text]"/>
-      <dgm:spPr/>
-      <dgm:t>
-        <a:bodyPr/>
-        <a:lstStyle/>
-        <a:p>
-          <a:r>
-            <a:rPr lang="en-US" dirty="0"/>
-            <a:t>Layer 2</a:t>
-          </a:r>
-        </a:p>
-      </dgm:t>
-    </dgm:pt>
-    <dgm:pt modelId="{C4745C93-6E3A-4F35-AEBA-AF5819E174FC}" type="parTrans" cxnId="{3E2BEB6D-12B2-42DB-BB42-AB9DE436CD39}">
-      <dgm:prSet/>
-      <dgm:spPr/>
-      <dgm:t>
-        <a:bodyPr/>
-        <a:lstStyle/>
-        <a:p>
-          <a:endParaRPr lang="en-US"/>
-        </a:p>
-      </dgm:t>
-    </dgm:pt>
-    <dgm:pt modelId="{47F8B031-CA17-4459-9FAB-75A05DCF4297}" type="sibTrans" cxnId="{3E2BEB6D-12B2-42DB-BB42-AB9DE436CD39}">
-      <dgm:prSet/>
-      <dgm:spPr/>
-      <dgm:t>
-        <a:bodyPr/>
-        <a:lstStyle/>
-        <a:p>
-          <a:endParaRPr lang="en-US"/>
-        </a:p>
-      </dgm:t>
-    </dgm:pt>
-    <dgm:pt modelId="{D2EAC379-BD47-4006-8B56-6552E9520C18}">
-      <dgm:prSet phldrT="[Text]"/>
-      <dgm:spPr/>
-      <dgm:t>
-        <a:bodyPr/>
-        <a:lstStyle/>
-        <a:p>
-          <a:r>
-            <a:rPr lang="en-US" dirty="0"/>
-            <a:t>Ethereum p2p Network of nodes</a:t>
-          </a:r>
-        </a:p>
-      </dgm:t>
-    </dgm:pt>
-    <dgm:pt modelId="{F97E0F69-2A6E-4861-9AA8-1EE38194623E}" type="parTrans" cxnId="{C5DE5ABF-9BCF-4B4B-9AE3-7C23AAEEC6FC}">
-      <dgm:prSet/>
-      <dgm:spPr/>
-    </dgm:pt>
-    <dgm:pt modelId="{042D915D-3E96-460A-A71B-7C1D9FAC6CE9}" type="sibTrans" cxnId="{C5DE5ABF-9BCF-4B4B-9AE3-7C23AAEEC6FC}">
-      <dgm:prSet/>
-      <dgm:spPr/>
-    </dgm:pt>
-    <dgm:pt modelId="{B60CD647-3BEF-4D40-8ED8-1F12FC0EF793}">
-      <dgm:prSet phldrT="[Text]"/>
-      <dgm:spPr/>
-      <dgm:t>
-        <a:bodyPr/>
-        <a:lstStyle/>
-        <a:p>
-          <a:r>
-            <a:rPr lang="en-US" dirty="0"/>
-            <a:t>Execution </a:t>
-          </a:r>
-        </a:p>
-      </dgm:t>
-    </dgm:pt>
-    <dgm:pt modelId="{859D5C03-4752-4E63-BE13-C6CC3E5F18C0}" type="parTrans" cxnId="{DBC5EAF9-7F9E-4B0D-8529-EB20BFF7CE68}">
-      <dgm:prSet/>
-      <dgm:spPr/>
-      <dgm:t>
-        <a:bodyPr/>
-        <a:lstStyle/>
-        <a:p>
-          <a:endParaRPr lang="en-US"/>
-        </a:p>
-      </dgm:t>
-    </dgm:pt>
-    <dgm:pt modelId="{8DB3609F-DFDD-4D52-90F3-94B7EA989F73}" type="sibTrans" cxnId="{DBC5EAF9-7F9E-4B0D-8529-EB20BFF7CE68}">
-      <dgm:prSet/>
-      <dgm:spPr/>
-      <dgm:t>
-        <a:bodyPr/>
-        <a:lstStyle/>
-        <a:p>
-          <a:endParaRPr lang="en-US"/>
-        </a:p>
-      </dgm:t>
-    </dgm:pt>
-    <dgm:pt modelId="{8444367B-FDC5-4770-9C82-E4DD0EAC3889}">
-      <dgm:prSet phldrT="[Text]"/>
-      <dgm:spPr/>
-      <dgm:t>
-        <a:bodyPr/>
-        <a:lstStyle/>
-        <a:p>
-          <a:r>
-            <a:rPr lang="en-US" dirty="0"/>
-            <a:t>Consensus</a:t>
-          </a:r>
-        </a:p>
-      </dgm:t>
-    </dgm:pt>
-    <dgm:pt modelId="{7C1E6990-33B4-402E-A0EB-95F5A23510FE}" type="parTrans" cxnId="{0674FDF0-31C6-4757-BEF6-87F2415784BF}">
-      <dgm:prSet/>
-      <dgm:spPr/>
-    </dgm:pt>
-    <dgm:pt modelId="{745DADDA-24E0-40E4-A40F-81618F169572}" type="sibTrans" cxnId="{0674FDF0-31C6-4757-BEF6-87F2415784BF}">
-      <dgm:prSet/>
-      <dgm:spPr/>
-    </dgm:pt>
-    <dgm:pt modelId="{18C73D57-DD83-4D68-8D84-169C4B7E6938}">
-      <dgm:prSet phldrT="[Text]"/>
-      <dgm:spPr/>
-      <dgm:t>
-        <a:bodyPr/>
-        <a:lstStyle/>
-        <a:p>
-          <a:r>
-            <a:rPr lang="en-US" dirty="0" err="1"/>
-            <a:t>dApps</a:t>
-          </a:r>
-          <a:endParaRPr lang="en-US" dirty="0"/>
-        </a:p>
-      </dgm:t>
-    </dgm:pt>
-    <dgm:pt modelId="{38DA0842-0E38-46AB-AAEA-863BE5C8EE7B}" type="parTrans" cxnId="{9DB45541-9E90-4215-BE4A-F29FA90223F4}">
-      <dgm:prSet/>
-      <dgm:spPr/>
-    </dgm:pt>
-    <dgm:pt modelId="{103C0CD9-13DE-41F8-8426-0875A60A846C}" type="sibTrans" cxnId="{9DB45541-9E90-4215-BE4A-F29FA90223F4}">
-      <dgm:prSet/>
-      <dgm:spPr/>
-    </dgm:pt>
-    <dgm:pt modelId="{BCE0C52C-5D87-4FB6-AF8F-6F9CFC440952}">
-      <dgm:prSet phldrT="[Text]"/>
-      <dgm:spPr/>
-      <dgm:t>
-        <a:bodyPr/>
-        <a:lstStyle/>
-        <a:p>
-          <a:r>
-            <a:rPr lang="en-US" dirty="0"/>
-            <a:t>Oracle Provisioning</a:t>
-          </a:r>
-        </a:p>
-      </dgm:t>
-    </dgm:pt>
-    <dgm:pt modelId="{5180C354-CF71-463A-9EEB-DE3FC0E286A3}" type="parTrans" cxnId="{91454CB2-E2E3-4EA0-932B-2CA5DE706732}">
-      <dgm:prSet/>
-      <dgm:spPr/>
-    </dgm:pt>
-    <dgm:pt modelId="{CF9307D0-2BF5-403E-AC9F-A65EEC1125E8}" type="sibTrans" cxnId="{91454CB2-E2E3-4EA0-932B-2CA5DE706732}">
-      <dgm:prSet/>
-      <dgm:spPr/>
-    </dgm:pt>
-    <dgm:pt modelId="{08DCA052-573F-49F3-98DB-D71A859FDA56}">
-      <dgm:prSet phldrT="[Text]"/>
-      <dgm:spPr/>
-      <dgm:t>
-        <a:bodyPr/>
-        <a:lstStyle/>
-        <a:p>
-          <a:r>
-            <a:rPr lang="en-US" dirty="0" err="1"/>
-            <a:t>Stablecoins</a:t>
-          </a:r>
-          <a:endParaRPr lang="en-US" dirty="0"/>
-        </a:p>
-      </dgm:t>
-    </dgm:pt>
-    <dgm:pt modelId="{42642F44-2D94-41C9-9F3E-D8CAF63C075A}" type="parTrans" cxnId="{3A6A494D-5D4A-49B1-A628-9764D0033378}">
-      <dgm:prSet/>
-      <dgm:spPr/>
-    </dgm:pt>
-    <dgm:pt modelId="{4F86E1F8-C9F2-4407-82DA-268426AE9826}" type="sibTrans" cxnId="{3A6A494D-5D4A-49B1-A628-9764D0033378}">
-      <dgm:prSet/>
-      <dgm:spPr/>
-    </dgm:pt>
-    <dgm:pt modelId="{1F87A4AD-B237-459B-AC03-E528DC58A407}">
-      <dgm:prSet phldrT="[Text]"/>
-      <dgm:spPr/>
-      <dgm:t>
-        <a:bodyPr/>
-        <a:lstStyle/>
-        <a:p>
-          <a:r>
-            <a:rPr lang="en-US" dirty="0"/>
-            <a:t>Wrapping</a:t>
-          </a:r>
-        </a:p>
-      </dgm:t>
-    </dgm:pt>
-    <dgm:pt modelId="{FDF2B511-29DE-4CB3-B675-483191E236D7}" type="parTrans" cxnId="{081771C1-3151-47BF-9342-92C85A4B2B31}">
-      <dgm:prSet/>
-      <dgm:spPr/>
-    </dgm:pt>
-    <dgm:pt modelId="{4BDED1E2-80FE-493A-8339-960BBDFC387F}" type="sibTrans" cxnId="{081771C1-3151-47BF-9342-92C85A4B2B31}">
-      <dgm:prSet/>
-      <dgm:spPr/>
-    </dgm:pt>
-    <dgm:pt modelId="{6C8E74AC-571D-4707-8EC2-E31435098B17}" type="pres">
-      <dgm:prSet presAssocID="{3D47EE8F-041D-41B3-B5FE-05D319419F74}" presName="linear" presStyleCnt="0">
-        <dgm:presLayoutVars>
-          <dgm:animLvl val="lvl"/>
-          <dgm:resizeHandles val="exact"/>
-        </dgm:presLayoutVars>
-      </dgm:prSet>
-      <dgm:spPr/>
-    </dgm:pt>
-    <dgm:pt modelId="{30E9F780-0315-4715-BD2F-E38495F5E2BD}" type="pres">
-      <dgm:prSet presAssocID="{A1DE696C-8BBD-4681-9895-8D682CC6003E}" presName="parentText" presStyleLbl="node1" presStyleIdx="0" presStyleCnt="3">
-        <dgm:presLayoutVars>
-          <dgm:chMax val="0"/>
-          <dgm:bulletEnabled val="1"/>
-        </dgm:presLayoutVars>
-      </dgm:prSet>
-      <dgm:spPr/>
-    </dgm:pt>
-    <dgm:pt modelId="{0778886B-57B6-42F6-B3D7-0FB17C2FDC34}" type="pres">
-      <dgm:prSet presAssocID="{A1DE696C-8BBD-4681-9895-8D682CC6003E}" presName="childText" presStyleLbl="revTx" presStyleIdx="0" presStyleCnt="3">
-        <dgm:presLayoutVars>
-          <dgm:bulletEnabled val="1"/>
-        </dgm:presLayoutVars>
-      </dgm:prSet>
-      <dgm:spPr/>
-    </dgm:pt>
-    <dgm:pt modelId="{B76E07DC-C646-46BE-8D91-1F4D290AEA1A}" type="pres">
-      <dgm:prSet presAssocID="{47078A50-6C04-4E9A-9963-6C41A96EDB50}" presName="parentText" presStyleLbl="node1" presStyleIdx="1" presStyleCnt="3">
-        <dgm:presLayoutVars>
-          <dgm:chMax val="0"/>
-          <dgm:bulletEnabled val="1"/>
-        </dgm:presLayoutVars>
-      </dgm:prSet>
-      <dgm:spPr/>
-    </dgm:pt>
-    <dgm:pt modelId="{E0EC2A85-F2F8-4E0A-8CA5-6C607F95DBED}" type="pres">
-      <dgm:prSet presAssocID="{47078A50-6C04-4E9A-9963-6C41A96EDB50}" presName="childText" presStyleLbl="revTx" presStyleIdx="1" presStyleCnt="3">
-        <dgm:presLayoutVars>
-          <dgm:bulletEnabled val="1"/>
-        </dgm:presLayoutVars>
-      </dgm:prSet>
-      <dgm:spPr/>
-    </dgm:pt>
-    <dgm:pt modelId="{18C6B172-D4AD-42A3-9E41-254F3CD890CA}" type="pres">
-      <dgm:prSet presAssocID="{D2EAC379-BD47-4006-8B56-6552E9520C18}" presName="parentText" presStyleLbl="node1" presStyleIdx="2" presStyleCnt="3">
-        <dgm:presLayoutVars>
-          <dgm:chMax val="0"/>
-          <dgm:bulletEnabled val="1"/>
-        </dgm:presLayoutVars>
-      </dgm:prSet>
-      <dgm:spPr/>
-    </dgm:pt>
-    <dgm:pt modelId="{46FF82A9-9E3C-4BA0-A05D-A1FB9326BAEB}" type="pres">
-      <dgm:prSet presAssocID="{D2EAC379-BD47-4006-8B56-6552E9520C18}" presName="childText" presStyleLbl="revTx" presStyleIdx="2" presStyleCnt="3">
-        <dgm:presLayoutVars>
-          <dgm:bulletEnabled val="1"/>
-        </dgm:presLayoutVars>
-      </dgm:prSet>
-      <dgm:spPr/>
-    </dgm:pt>
-  </dgm:ptLst>
-  <dgm:cxnLst>
-    <dgm:cxn modelId="{D1C17B38-5822-4739-B4D5-BE5ED2395F2B}" type="presOf" srcId="{47078A50-6C04-4E9A-9963-6C41A96EDB50}" destId="{B76E07DC-C646-46BE-8D91-1F4D290AEA1A}" srcOrd="0" destOrd="0" presId="urn:microsoft.com/office/officeart/2005/8/layout/vList2"/>
-    <dgm:cxn modelId="{96A82A40-0A7F-42D9-BA62-E8F31ED13CF2}" type="presOf" srcId="{0C3C4790-D623-4B81-9B73-4DDAFDBCD538}" destId="{E0EC2A85-F2F8-4E0A-8CA5-6C607F95DBED}" srcOrd="0" destOrd="0" presId="urn:microsoft.com/office/officeart/2005/8/layout/vList2"/>
-    <dgm:cxn modelId="{9DB45541-9E90-4215-BE4A-F29FA90223F4}" srcId="{47078A50-6C04-4E9A-9963-6C41A96EDB50}" destId="{18C73D57-DD83-4D68-8D84-169C4B7E6938}" srcOrd="1" destOrd="0" parTransId="{38DA0842-0E38-46AB-AAEA-863BE5C8EE7B}" sibTransId="{103C0CD9-13DE-41F8-8426-0875A60A846C}"/>
-    <dgm:cxn modelId="{FF4E2643-9552-4595-8FCF-F9881D0F3B84}" type="presOf" srcId="{A1DE696C-8BBD-4681-9895-8D682CC6003E}" destId="{30E9F780-0315-4715-BD2F-E38495F5E2BD}" srcOrd="0" destOrd="0" presId="urn:microsoft.com/office/officeart/2005/8/layout/vList2"/>
-    <dgm:cxn modelId="{7A6F2B49-5B8A-4C7F-AF04-9DBD5332662A}" type="presOf" srcId="{D2EAC379-BD47-4006-8B56-6552E9520C18}" destId="{18C6B172-D4AD-42A3-9E41-254F3CD890CA}" srcOrd="0" destOrd="0" presId="urn:microsoft.com/office/officeart/2005/8/layout/vList2"/>
-    <dgm:cxn modelId="{3A6A494D-5D4A-49B1-A628-9764D0033378}" srcId="{47078A50-6C04-4E9A-9963-6C41A96EDB50}" destId="{08DCA052-573F-49F3-98DB-D71A859FDA56}" srcOrd="3" destOrd="0" parTransId="{42642F44-2D94-41C9-9F3E-D8CAF63C075A}" sibTransId="{4F86E1F8-C9F2-4407-82DA-268426AE9826}"/>
-    <dgm:cxn modelId="{3E2BEB6D-12B2-42DB-BB42-AB9DE436CD39}" srcId="{47078A50-6C04-4E9A-9963-6C41A96EDB50}" destId="{0C3C4790-D623-4B81-9B73-4DDAFDBCD538}" srcOrd="0" destOrd="0" parTransId="{C4745C93-6E3A-4F35-AEBA-AF5819E174FC}" sibTransId="{47F8B031-CA17-4459-9FAB-75A05DCF4297}"/>
-    <dgm:cxn modelId="{C516CB55-A5F7-4F8A-86F5-DDC0DAA8C829}" type="presOf" srcId="{B60CD647-3BEF-4D40-8ED8-1F12FC0EF793}" destId="{46FF82A9-9E3C-4BA0-A05D-A1FB9326BAEB}" srcOrd="0" destOrd="0" presId="urn:microsoft.com/office/officeart/2005/8/layout/vList2"/>
-    <dgm:cxn modelId="{E2DBD857-4F92-4421-89C5-35B7D22DF015}" type="presOf" srcId="{3D47EE8F-041D-41B3-B5FE-05D319419F74}" destId="{6C8E74AC-571D-4707-8EC2-E31435098B17}" srcOrd="0" destOrd="0" presId="urn:microsoft.com/office/officeart/2005/8/layout/vList2"/>
-    <dgm:cxn modelId="{9A17B590-D81B-471F-B234-DDEB5D5F772F}" type="presOf" srcId="{BCE0C52C-5D87-4FB6-AF8F-6F9CFC440952}" destId="{E0EC2A85-F2F8-4E0A-8CA5-6C607F95DBED}" srcOrd="0" destOrd="2" presId="urn:microsoft.com/office/officeart/2005/8/layout/vList2"/>
-    <dgm:cxn modelId="{03074898-20FA-4489-9902-3BF898ED2D95}" srcId="{3D47EE8F-041D-41B3-B5FE-05D319419F74}" destId="{A1DE696C-8BBD-4681-9895-8D682CC6003E}" srcOrd="0" destOrd="0" parTransId="{F366A476-8853-437F-ACA0-912E4CE6837C}" sibTransId="{8573D246-7A5B-4136-9351-D95660AADB26}"/>
-    <dgm:cxn modelId="{91454CB2-E2E3-4EA0-932B-2CA5DE706732}" srcId="{47078A50-6C04-4E9A-9963-6C41A96EDB50}" destId="{BCE0C52C-5D87-4FB6-AF8F-6F9CFC440952}" srcOrd="2" destOrd="0" parTransId="{5180C354-CF71-463A-9EEB-DE3FC0E286A3}" sibTransId="{CF9307D0-2BF5-403E-AC9F-A65EEC1125E8}"/>
-    <dgm:cxn modelId="{C5DE5ABF-9BCF-4B4B-9AE3-7C23AAEEC6FC}" srcId="{3D47EE8F-041D-41B3-B5FE-05D319419F74}" destId="{D2EAC379-BD47-4006-8B56-6552E9520C18}" srcOrd="2" destOrd="0" parTransId="{F97E0F69-2A6E-4861-9AA8-1EE38194623E}" sibTransId="{042D915D-3E96-460A-A71B-7C1D9FAC6CE9}"/>
-    <dgm:cxn modelId="{081771C1-3151-47BF-9342-92C85A4B2B31}" srcId="{47078A50-6C04-4E9A-9963-6C41A96EDB50}" destId="{1F87A4AD-B237-459B-AC03-E528DC58A407}" srcOrd="4" destOrd="0" parTransId="{FDF2B511-29DE-4CB3-B675-483191E236D7}" sibTransId="{4BDED1E2-80FE-493A-8339-960BBDFC387F}"/>
-    <dgm:cxn modelId="{F68FE6C1-289A-43AC-9682-BC5AF887822D}" type="presOf" srcId="{1F87A4AD-B237-459B-AC03-E528DC58A407}" destId="{E0EC2A85-F2F8-4E0A-8CA5-6C607F95DBED}" srcOrd="0" destOrd="4" presId="urn:microsoft.com/office/officeart/2005/8/layout/vList2"/>
-    <dgm:cxn modelId="{FDEE20CD-F742-4B48-8D3D-833C36FE632C}" srcId="{3D47EE8F-041D-41B3-B5FE-05D319419F74}" destId="{47078A50-6C04-4E9A-9963-6C41A96EDB50}" srcOrd="1" destOrd="0" parTransId="{4CDB77C6-6095-4AA5-A338-B356F083B4F1}" sibTransId="{9B7B157E-7C37-40DB-BD5F-C1A47BF58EE1}"/>
-    <dgm:cxn modelId="{030D67CE-756D-47B9-A50D-D8B1D0CFF184}" type="presOf" srcId="{18C73D57-DD83-4D68-8D84-169C4B7E6938}" destId="{E0EC2A85-F2F8-4E0A-8CA5-6C607F95DBED}" srcOrd="0" destOrd="1" presId="urn:microsoft.com/office/officeart/2005/8/layout/vList2"/>
-    <dgm:cxn modelId="{A4B557D0-4E1B-408C-A9D9-03AD1BD7CE69}" srcId="{A1DE696C-8BBD-4681-9895-8D682CC6003E}" destId="{3A841049-5F75-48A8-AF3A-1AB392632C03}" srcOrd="0" destOrd="0" parTransId="{DF1BA6EF-EC25-451C-A9F9-947562CB76CE}" sibTransId="{096D2619-1ECB-4D32-B6E1-34B53380FC65}"/>
-    <dgm:cxn modelId="{BB05E7DA-4BF4-4925-BC1D-205261BA21A6}" type="presOf" srcId="{3A841049-5F75-48A8-AF3A-1AB392632C03}" destId="{0778886B-57B6-42F6-B3D7-0FB17C2FDC34}" srcOrd="0" destOrd="0" presId="urn:microsoft.com/office/officeart/2005/8/layout/vList2"/>
-    <dgm:cxn modelId="{8E6026E7-3C12-4C34-BC7D-32240D4BA692}" type="presOf" srcId="{08DCA052-573F-49F3-98DB-D71A859FDA56}" destId="{E0EC2A85-F2F8-4E0A-8CA5-6C607F95DBED}" srcOrd="0" destOrd="3" presId="urn:microsoft.com/office/officeart/2005/8/layout/vList2"/>
-    <dgm:cxn modelId="{0674FDF0-31C6-4757-BEF6-87F2415784BF}" srcId="{D2EAC379-BD47-4006-8B56-6552E9520C18}" destId="{8444367B-FDC5-4770-9C82-E4DD0EAC3889}" srcOrd="1" destOrd="0" parTransId="{7C1E6990-33B4-402E-A0EB-95F5A23510FE}" sibTransId="{745DADDA-24E0-40E4-A40F-81618F169572}"/>
-    <dgm:cxn modelId="{DBC5EAF9-7F9E-4B0D-8529-EB20BFF7CE68}" srcId="{D2EAC379-BD47-4006-8B56-6552E9520C18}" destId="{B60CD647-3BEF-4D40-8ED8-1F12FC0EF793}" srcOrd="0" destOrd="0" parTransId="{859D5C03-4752-4E63-BE13-C6CC3E5F18C0}" sibTransId="{8DB3609F-DFDD-4D52-90F3-94B7EA989F73}"/>
-    <dgm:cxn modelId="{0A8E20FA-6DD3-45F4-B7A5-E29BECE2A4B3}" type="presOf" srcId="{8444367B-FDC5-4770-9C82-E4DD0EAC3889}" destId="{46FF82A9-9E3C-4BA0-A05D-A1FB9326BAEB}" srcOrd="0" destOrd="1" presId="urn:microsoft.com/office/officeart/2005/8/layout/vList2"/>
-    <dgm:cxn modelId="{5B1F2028-5F9C-46D0-8E84-5AC01219FA41}" type="presParOf" srcId="{6C8E74AC-571D-4707-8EC2-E31435098B17}" destId="{30E9F780-0315-4715-BD2F-E38495F5E2BD}" srcOrd="0" destOrd="0" presId="urn:microsoft.com/office/officeart/2005/8/layout/vList2"/>
-    <dgm:cxn modelId="{031459B3-5579-42B0-A7AC-4F696BDF6E03}" type="presParOf" srcId="{6C8E74AC-571D-4707-8EC2-E31435098B17}" destId="{0778886B-57B6-42F6-B3D7-0FB17C2FDC34}" srcOrd="1" destOrd="0" presId="urn:microsoft.com/office/officeart/2005/8/layout/vList2"/>
-    <dgm:cxn modelId="{676F56AC-772A-4F20-822F-43EC90F33826}" type="presParOf" srcId="{6C8E74AC-571D-4707-8EC2-E31435098B17}" destId="{B76E07DC-C646-46BE-8D91-1F4D290AEA1A}" srcOrd="2" destOrd="0" presId="urn:microsoft.com/office/officeart/2005/8/layout/vList2"/>
-    <dgm:cxn modelId="{5EADD391-253C-447B-BFAA-8E4154B50A50}" type="presParOf" srcId="{6C8E74AC-571D-4707-8EC2-E31435098B17}" destId="{E0EC2A85-F2F8-4E0A-8CA5-6C607F95DBED}" srcOrd="3" destOrd="0" presId="urn:microsoft.com/office/officeart/2005/8/layout/vList2"/>
-    <dgm:cxn modelId="{54268739-3FDD-4206-BE3C-BD98229059A3}" type="presParOf" srcId="{6C8E74AC-571D-4707-8EC2-E31435098B17}" destId="{18C6B172-D4AD-42A3-9E41-254F3CD890CA}" srcOrd="4" destOrd="0" presId="urn:microsoft.com/office/officeart/2005/8/layout/vList2"/>
-    <dgm:cxn modelId="{1B0A5867-FFB0-4280-BEBE-D5520F42168A}" type="presParOf" srcId="{6C8E74AC-571D-4707-8EC2-E31435098B17}" destId="{46FF82A9-9E3C-4BA0-A05D-A1FB9326BAEB}" srcOrd="5" destOrd="0" presId="urn:microsoft.com/office/officeart/2005/8/layout/vList2"/>
-  </dgm:cxnLst>
-  <dgm:bg/>
-  <dgm:whole/>
-  <dgm:extLst>
-    <a:ext uri="http://schemas.microsoft.com/office/drawing/2008/diagram">
-      <dsp:dataModelExt xmlns:dsp="http://schemas.microsoft.com/office/drawing/2008/diagram" relId="rId6" minVer="http://schemas.openxmlformats.org/drawingml/2006/diagram"/>
-    </a:ext>
-  </dgm:extLst>
-</dgm:dataModel>
-</file>
-
-<file path=ppt/diagrams/drawing1.xml><?xml version="1.0" encoding="utf-8"?>
-<dsp:drawing xmlns:dgm="http://schemas.openxmlformats.org/drawingml/2006/diagram" xmlns:dsp="http://schemas.microsoft.com/office/drawing/2008/diagram" xmlns:a="http://schemas.openxmlformats.org/drawingml/2006/main">
-  <dsp:spTree>
-    <dsp:nvGrpSpPr>
-      <dsp:cNvPr id="0" name=""/>
-      <dsp:cNvGrpSpPr/>
-    </dsp:nvGrpSpPr>
-    <dsp:grpSpPr/>
-    <dsp:sp modelId="{30E9F780-0315-4715-BD2F-E38495F5E2BD}">
-      <dsp:nvSpPr>
-        <dsp:cNvPr id="0" name=""/>
-        <dsp:cNvSpPr/>
-      </dsp:nvSpPr>
-      <dsp:spPr>
-        <a:xfrm>
-          <a:off x="0" y="37672"/>
-          <a:ext cx="8128000" cy="695565"/>
-        </a:xfrm>
-        <a:prstGeom prst="roundRect">
-          <a:avLst/>
-        </a:prstGeom>
-        <a:solidFill>
-          <a:schemeClr val="accent1">
-            <a:hueOff val="0"/>
-            <a:satOff val="0"/>
-            <a:lumOff val="0"/>
-            <a:alphaOff val="0"/>
-          </a:schemeClr>
-        </a:solidFill>
-        <a:ln w="12700" cap="flat" cmpd="sng" algn="ctr">
-          <a:solidFill>
-            <a:schemeClr val="lt1">
-              <a:hueOff val="0"/>
-              <a:satOff val="0"/>
-              <a:lumOff val="0"/>
-              <a:alphaOff val="0"/>
-            </a:schemeClr>
-          </a:solidFill>
-          <a:prstDash val="solid"/>
-          <a:miter lim="800000"/>
-        </a:ln>
-        <a:effectLst/>
-      </dsp:spPr>
-      <dsp:style>
-        <a:lnRef idx="2">
-          <a:scrgbClr r="0" g="0" b="0"/>
-        </a:lnRef>
-        <a:fillRef idx="1">
-          <a:scrgbClr r="0" g="0" b="0"/>
-        </a:fillRef>
-        <a:effectRef idx="0">
-          <a:scrgbClr r="0" g="0" b="0"/>
-        </a:effectRef>
-        <a:fontRef idx="minor">
-          <a:schemeClr val="lt1"/>
-        </a:fontRef>
-      </dsp:style>
-      <dsp:txBody>
-        <a:bodyPr spcFirstLastPara="0" vert="horz" wrap="square" lIns="110490" tIns="110490" rIns="110490" bIns="110490" numCol="1" spcCol="1270" anchor="ctr" anchorCtr="0">
-          <a:noAutofit/>
-        </a:bodyPr>
-        <a:lstStyle/>
-        <a:p>
-          <a:pPr marL="0" lvl="0" indent="0" algn="l" defTabSz="1289050">
-            <a:lnSpc>
-              <a:spcPct val="90000"/>
-            </a:lnSpc>
-            <a:spcBef>
-              <a:spcPct val="0"/>
-            </a:spcBef>
-            <a:spcAft>
-              <a:spcPct val="35000"/>
-            </a:spcAft>
-            <a:buNone/>
-          </a:pPr>
-          <a:r>
-            <a:rPr lang="en-US" sz="2900" kern="1200"/>
-            <a:t>End-users</a:t>
-          </a:r>
-          <a:endParaRPr lang="en-US" sz="2900" kern="1200" dirty="0"/>
-        </a:p>
-      </dsp:txBody>
-      <dsp:txXfrm>
-        <a:off x="33955" y="71627"/>
-        <a:ext cx="8060090" cy="627655"/>
-      </dsp:txXfrm>
-    </dsp:sp>
-    <dsp:sp modelId="{0778886B-57B6-42F6-B3D7-0FB17C2FDC34}">
-      <dsp:nvSpPr>
-        <dsp:cNvPr id="0" name=""/>
-        <dsp:cNvSpPr/>
-      </dsp:nvSpPr>
-      <dsp:spPr>
-        <a:xfrm>
-          <a:off x="0" y="733237"/>
-          <a:ext cx="8128000" cy="480240"/>
-        </a:xfrm>
-        <a:prstGeom prst="rect">
-          <a:avLst/>
-        </a:prstGeom>
-        <a:noFill/>
-        <a:ln>
-          <a:noFill/>
-        </a:ln>
-        <a:effectLst/>
-      </dsp:spPr>
-      <dsp:style>
-        <a:lnRef idx="0">
-          <a:scrgbClr r="0" g="0" b="0"/>
-        </a:lnRef>
-        <a:fillRef idx="0">
-          <a:scrgbClr r="0" g="0" b="0"/>
-        </a:fillRef>
-        <a:effectRef idx="0">
-          <a:scrgbClr r="0" g="0" b="0"/>
-        </a:effectRef>
-        <a:fontRef idx="minor"/>
-      </dsp:style>
-      <dsp:txBody>
-        <a:bodyPr spcFirstLastPara="0" vert="horz" wrap="square" lIns="258064" tIns="36830" rIns="206248" bIns="36830" numCol="1" spcCol="1270" anchor="t" anchorCtr="0">
-          <a:noAutofit/>
-        </a:bodyPr>
-        <a:lstStyle/>
-        <a:p>
-          <a:pPr marL="228600" lvl="1" indent="-228600" algn="l" defTabSz="1022350">
-            <a:lnSpc>
-              <a:spcPct val="90000"/>
-            </a:lnSpc>
-            <a:spcBef>
-              <a:spcPct val="0"/>
-            </a:spcBef>
-            <a:spcAft>
-              <a:spcPct val="20000"/>
-            </a:spcAft>
-            <a:buChar char="•"/>
-          </a:pPr>
-          <a:r>
-            <a:rPr lang="en-US" sz="2300" kern="1200" dirty="0"/>
-            <a:t>Wallet holders</a:t>
-          </a:r>
-        </a:p>
-      </dsp:txBody>
-      <dsp:txXfrm>
-        <a:off x="0" y="733237"/>
-        <a:ext cx="8128000" cy="480240"/>
-      </dsp:txXfrm>
-    </dsp:sp>
-    <dsp:sp modelId="{B76E07DC-C646-46BE-8D91-1F4D290AEA1A}">
-      <dsp:nvSpPr>
-        <dsp:cNvPr id="0" name=""/>
-        <dsp:cNvSpPr/>
-      </dsp:nvSpPr>
-      <dsp:spPr>
-        <a:xfrm>
-          <a:off x="0" y="1213477"/>
-          <a:ext cx="8128000" cy="695565"/>
-        </a:xfrm>
-        <a:prstGeom prst="roundRect">
-          <a:avLst/>
-        </a:prstGeom>
-        <a:solidFill>
-          <a:schemeClr val="accent1">
-            <a:hueOff val="0"/>
-            <a:satOff val="0"/>
-            <a:lumOff val="0"/>
-            <a:alphaOff val="0"/>
-          </a:schemeClr>
-        </a:solidFill>
-        <a:ln w="12700" cap="flat" cmpd="sng" algn="ctr">
-          <a:solidFill>
-            <a:schemeClr val="lt1">
-              <a:hueOff val="0"/>
-              <a:satOff val="0"/>
-              <a:lumOff val="0"/>
-              <a:alphaOff val="0"/>
-            </a:schemeClr>
-          </a:solidFill>
-          <a:prstDash val="solid"/>
-          <a:miter lim="800000"/>
-        </a:ln>
-        <a:effectLst/>
-      </dsp:spPr>
-      <dsp:style>
-        <a:lnRef idx="2">
-          <a:scrgbClr r="0" g="0" b="0"/>
-        </a:lnRef>
-        <a:fillRef idx="1">
-          <a:scrgbClr r="0" g="0" b="0"/>
-        </a:fillRef>
-        <a:effectRef idx="0">
-          <a:scrgbClr r="0" g="0" b="0"/>
-        </a:effectRef>
-        <a:fontRef idx="minor">
-          <a:schemeClr val="lt1"/>
-        </a:fontRef>
-      </dsp:style>
-      <dsp:txBody>
-        <a:bodyPr spcFirstLastPara="0" vert="horz" wrap="square" lIns="110490" tIns="110490" rIns="110490" bIns="110490" numCol="1" spcCol="1270" anchor="ctr" anchorCtr="0">
-          <a:noAutofit/>
-        </a:bodyPr>
-        <a:lstStyle/>
-        <a:p>
-          <a:pPr marL="0" lvl="0" indent="0" algn="l" defTabSz="1289050">
-            <a:lnSpc>
-              <a:spcPct val="90000"/>
-            </a:lnSpc>
-            <a:spcBef>
-              <a:spcPct val="0"/>
-            </a:spcBef>
-            <a:spcAft>
-              <a:spcPct val="35000"/>
-            </a:spcAft>
-            <a:buNone/>
-          </a:pPr>
-          <a:r>
-            <a:rPr lang="en-US" sz="2900" kern="1200" dirty="0"/>
-            <a:t>Application </a:t>
-          </a:r>
-          <a:r>
-            <a:rPr lang="en-US" sz="2900" kern="1200" dirty="0" err="1"/>
-            <a:t>Developement</a:t>
-          </a:r>
-          <a:endParaRPr lang="en-US" sz="2900" kern="1200" dirty="0"/>
-        </a:p>
-      </dsp:txBody>
-      <dsp:txXfrm>
-        <a:off x="33955" y="1247432"/>
-        <a:ext cx="8060090" cy="627655"/>
-      </dsp:txXfrm>
-    </dsp:sp>
-    <dsp:sp modelId="{E0EC2A85-F2F8-4E0A-8CA5-6C607F95DBED}">
-      <dsp:nvSpPr>
-        <dsp:cNvPr id="0" name=""/>
-        <dsp:cNvSpPr/>
-      </dsp:nvSpPr>
-      <dsp:spPr>
-        <a:xfrm>
-          <a:off x="0" y="1909042"/>
-          <a:ext cx="8128000" cy="1980989"/>
-        </a:xfrm>
-        <a:prstGeom prst="rect">
-          <a:avLst/>
-        </a:prstGeom>
-        <a:noFill/>
-        <a:ln>
-          <a:noFill/>
-        </a:ln>
-        <a:effectLst/>
-      </dsp:spPr>
-      <dsp:style>
-        <a:lnRef idx="0">
-          <a:scrgbClr r="0" g="0" b="0"/>
-        </a:lnRef>
-        <a:fillRef idx="0">
-          <a:scrgbClr r="0" g="0" b="0"/>
-        </a:fillRef>
-        <a:effectRef idx="0">
-          <a:scrgbClr r="0" g="0" b="0"/>
-        </a:effectRef>
-        <a:fontRef idx="minor"/>
-      </dsp:style>
-      <dsp:txBody>
-        <a:bodyPr spcFirstLastPara="0" vert="horz" wrap="square" lIns="258064" tIns="36830" rIns="206248" bIns="36830" numCol="1" spcCol="1270" anchor="t" anchorCtr="0">
-          <a:noAutofit/>
-        </a:bodyPr>
-        <a:lstStyle/>
-        <a:p>
-          <a:pPr marL="228600" lvl="1" indent="-228600" algn="l" defTabSz="1022350">
-            <a:lnSpc>
-              <a:spcPct val="90000"/>
-            </a:lnSpc>
-            <a:spcBef>
-              <a:spcPct val="0"/>
-            </a:spcBef>
-            <a:spcAft>
-              <a:spcPct val="20000"/>
-            </a:spcAft>
-            <a:buChar char="•"/>
-          </a:pPr>
-          <a:r>
-            <a:rPr lang="en-US" sz="2300" kern="1200" dirty="0"/>
-            <a:t>Layer 2</a:t>
-          </a:r>
-        </a:p>
-        <a:p>
-          <a:pPr marL="228600" lvl="1" indent="-228600" algn="l" defTabSz="1022350">
-            <a:lnSpc>
-              <a:spcPct val="90000"/>
-            </a:lnSpc>
-            <a:spcBef>
-              <a:spcPct val="0"/>
-            </a:spcBef>
-            <a:spcAft>
-              <a:spcPct val="20000"/>
-            </a:spcAft>
-            <a:buChar char="•"/>
-          </a:pPr>
-          <a:r>
-            <a:rPr lang="en-US" sz="2300" kern="1200" dirty="0" err="1"/>
-            <a:t>dApps</a:t>
-          </a:r>
-          <a:endParaRPr lang="en-US" sz="2300" kern="1200" dirty="0"/>
-        </a:p>
-        <a:p>
-          <a:pPr marL="228600" lvl="1" indent="-228600" algn="l" defTabSz="1022350">
-            <a:lnSpc>
-              <a:spcPct val="90000"/>
-            </a:lnSpc>
-            <a:spcBef>
-              <a:spcPct val="0"/>
-            </a:spcBef>
-            <a:spcAft>
-              <a:spcPct val="20000"/>
-            </a:spcAft>
-            <a:buChar char="•"/>
-          </a:pPr>
-          <a:r>
-            <a:rPr lang="en-US" sz="2300" kern="1200" dirty="0"/>
-            <a:t>Oracle Provisioning</a:t>
-          </a:r>
-        </a:p>
-        <a:p>
-          <a:pPr marL="228600" lvl="1" indent="-228600" algn="l" defTabSz="1022350">
-            <a:lnSpc>
-              <a:spcPct val="90000"/>
-            </a:lnSpc>
-            <a:spcBef>
-              <a:spcPct val="0"/>
-            </a:spcBef>
-            <a:spcAft>
-              <a:spcPct val="20000"/>
-            </a:spcAft>
-            <a:buChar char="•"/>
-          </a:pPr>
-          <a:r>
-            <a:rPr lang="en-US" sz="2300" kern="1200" dirty="0" err="1"/>
-            <a:t>Stablecoins</a:t>
-          </a:r>
-          <a:endParaRPr lang="en-US" sz="2300" kern="1200" dirty="0"/>
-        </a:p>
-        <a:p>
-          <a:pPr marL="228600" lvl="1" indent="-228600" algn="l" defTabSz="1022350">
-            <a:lnSpc>
-              <a:spcPct val="90000"/>
-            </a:lnSpc>
-            <a:spcBef>
-              <a:spcPct val="0"/>
-            </a:spcBef>
-            <a:spcAft>
-              <a:spcPct val="20000"/>
-            </a:spcAft>
-            <a:buChar char="•"/>
-          </a:pPr>
-          <a:r>
-            <a:rPr lang="en-US" sz="2300" kern="1200" dirty="0"/>
-            <a:t>Wrapping</a:t>
-          </a:r>
-        </a:p>
-      </dsp:txBody>
-      <dsp:txXfrm>
-        <a:off x="0" y="1909042"/>
-        <a:ext cx="8128000" cy="1980989"/>
-      </dsp:txXfrm>
-    </dsp:sp>
-    <dsp:sp modelId="{18C6B172-D4AD-42A3-9E41-254F3CD890CA}">
-      <dsp:nvSpPr>
-        <dsp:cNvPr id="0" name=""/>
-        <dsp:cNvSpPr/>
-      </dsp:nvSpPr>
-      <dsp:spPr>
-        <a:xfrm>
-          <a:off x="0" y="3890032"/>
-          <a:ext cx="8128000" cy="695565"/>
-        </a:xfrm>
-        <a:prstGeom prst="roundRect">
-          <a:avLst/>
-        </a:prstGeom>
-        <a:solidFill>
-          <a:schemeClr val="accent1">
-            <a:hueOff val="0"/>
-            <a:satOff val="0"/>
-            <a:lumOff val="0"/>
-            <a:alphaOff val="0"/>
-          </a:schemeClr>
-        </a:solidFill>
-        <a:ln w="12700" cap="flat" cmpd="sng" algn="ctr">
-          <a:solidFill>
-            <a:schemeClr val="lt1">
-              <a:hueOff val="0"/>
-              <a:satOff val="0"/>
-              <a:lumOff val="0"/>
-              <a:alphaOff val="0"/>
-            </a:schemeClr>
-          </a:solidFill>
-          <a:prstDash val="solid"/>
-          <a:miter lim="800000"/>
-        </a:ln>
-        <a:effectLst/>
-      </dsp:spPr>
-      <dsp:style>
-        <a:lnRef idx="2">
-          <a:scrgbClr r="0" g="0" b="0"/>
-        </a:lnRef>
-        <a:fillRef idx="1">
-          <a:scrgbClr r="0" g="0" b="0"/>
-        </a:fillRef>
-        <a:effectRef idx="0">
-          <a:scrgbClr r="0" g="0" b="0"/>
-        </a:effectRef>
-        <a:fontRef idx="minor">
-          <a:schemeClr val="lt1"/>
-        </a:fontRef>
-      </dsp:style>
-      <dsp:txBody>
-        <a:bodyPr spcFirstLastPara="0" vert="horz" wrap="square" lIns="110490" tIns="110490" rIns="110490" bIns="110490" numCol="1" spcCol="1270" anchor="ctr" anchorCtr="0">
-          <a:noAutofit/>
-        </a:bodyPr>
-        <a:lstStyle/>
-        <a:p>
-          <a:pPr marL="0" lvl="0" indent="0" algn="l" defTabSz="1289050">
-            <a:lnSpc>
-              <a:spcPct val="90000"/>
-            </a:lnSpc>
-            <a:spcBef>
-              <a:spcPct val="0"/>
-            </a:spcBef>
-            <a:spcAft>
-              <a:spcPct val="35000"/>
-            </a:spcAft>
-            <a:buNone/>
-          </a:pPr>
-          <a:r>
-            <a:rPr lang="en-US" sz="2900" kern="1200" dirty="0"/>
-            <a:t>Ethereum p2p Network of nodes</a:t>
-          </a:r>
-        </a:p>
-      </dsp:txBody>
-      <dsp:txXfrm>
-        <a:off x="33955" y="3923987"/>
-        <a:ext cx="8060090" cy="627655"/>
-      </dsp:txXfrm>
-    </dsp:sp>
-    <dsp:sp modelId="{46FF82A9-9E3C-4BA0-A05D-A1FB9326BAEB}">
-      <dsp:nvSpPr>
-        <dsp:cNvPr id="0" name=""/>
-        <dsp:cNvSpPr/>
-      </dsp:nvSpPr>
-      <dsp:spPr>
-        <a:xfrm>
-          <a:off x="0" y="4585597"/>
-          <a:ext cx="8128000" cy="795397"/>
-        </a:xfrm>
-        <a:prstGeom prst="rect">
-          <a:avLst/>
-        </a:prstGeom>
-        <a:noFill/>
-        <a:ln>
-          <a:noFill/>
-        </a:ln>
-        <a:effectLst/>
-      </dsp:spPr>
-      <dsp:style>
-        <a:lnRef idx="0">
-          <a:scrgbClr r="0" g="0" b="0"/>
-        </a:lnRef>
-        <a:fillRef idx="0">
-          <a:scrgbClr r="0" g="0" b="0"/>
-        </a:fillRef>
-        <a:effectRef idx="0">
-          <a:scrgbClr r="0" g="0" b="0"/>
-        </a:effectRef>
-        <a:fontRef idx="minor"/>
-      </dsp:style>
-      <dsp:txBody>
-        <a:bodyPr spcFirstLastPara="0" vert="horz" wrap="square" lIns="258064" tIns="36830" rIns="206248" bIns="36830" numCol="1" spcCol="1270" anchor="t" anchorCtr="0">
-          <a:noAutofit/>
-        </a:bodyPr>
-        <a:lstStyle/>
-        <a:p>
-          <a:pPr marL="228600" lvl="1" indent="-228600" algn="l" defTabSz="1022350">
-            <a:lnSpc>
-              <a:spcPct val="90000"/>
-            </a:lnSpc>
-            <a:spcBef>
-              <a:spcPct val="0"/>
-            </a:spcBef>
-            <a:spcAft>
-              <a:spcPct val="20000"/>
-            </a:spcAft>
-            <a:buChar char="•"/>
-          </a:pPr>
-          <a:r>
-            <a:rPr lang="en-US" sz="2300" kern="1200" dirty="0"/>
-            <a:t>Execution </a:t>
-          </a:r>
-        </a:p>
-        <a:p>
-          <a:pPr marL="228600" lvl="1" indent="-228600" algn="l" defTabSz="1022350">
-            <a:lnSpc>
-              <a:spcPct val="90000"/>
-            </a:lnSpc>
-            <a:spcBef>
-              <a:spcPct val="0"/>
-            </a:spcBef>
-            <a:spcAft>
-              <a:spcPct val="20000"/>
-            </a:spcAft>
-            <a:buChar char="•"/>
-          </a:pPr>
-          <a:r>
-            <a:rPr lang="en-US" sz="2300" kern="1200" dirty="0"/>
-            <a:t>Consensus</a:t>
-          </a:r>
-        </a:p>
-      </dsp:txBody>
-      <dsp:txXfrm>
-        <a:off x="0" y="4585597"/>
-        <a:ext cx="8128000" cy="795397"/>
-      </dsp:txXfrm>
-    </dsp:sp>
-  </dsp:spTree>
-</dsp:drawing>
-</file>
-
-<file path=ppt/diagrams/layout1.xml><?xml version="1.0" encoding="utf-8"?>
-<dgm:layoutDef xmlns:dgm="http://schemas.openxmlformats.org/drawingml/2006/diagram" xmlns:a="http://schemas.openxmlformats.org/drawingml/2006/main" uniqueId="urn:microsoft.com/office/officeart/2005/8/layout/vList2">
-  <dgm:title val=""/>
-  <dgm:desc val=""/>
-  <dgm:catLst>
-    <dgm:cat type="list" pri="3000"/>
-    <dgm:cat type="convert" pri="1000"/>
-  </dgm:catLst>
-  <dgm:sampData>
-    <dgm:dataModel>
-      <dgm:ptLst>
-        <dgm:pt modelId="0" type="doc"/>
-        <dgm:pt modelId="1">
-          <dgm:prSet phldr="1"/>
-        </dgm:pt>
-        <dgm:pt modelId="11">
-          <dgm:prSet phldr="1"/>
-        </dgm:pt>
-        <dgm:pt modelId="2">
-          <dgm:prSet phldr="1"/>
-        </dgm:pt>
-        <dgm:pt modelId="21">
-          <dgm:prSet phldr="1"/>
-        </dgm:pt>
-      </dgm:ptLst>
-      <dgm:cxnLst>
-        <dgm:cxn modelId="4" srcId="0" destId="1" srcOrd="0" destOrd="0"/>
-        <dgm:cxn modelId="5" srcId="0" destId="2" srcOrd="1" destOrd="0"/>
-        <dgm:cxn modelId="12" srcId="1" destId="11" srcOrd="0" destOrd="0"/>
-        <dgm:cxn modelId="23" srcId="2" destId="21" srcOrd="0" destOrd="0"/>
-      </dgm:cxnLst>
-      <dgm:bg/>
-      <dgm:whole/>
-    </dgm:dataModel>
-  </dgm:sampData>
-  <dgm:styleData>
-    <dgm:dataModel>
-      <dgm:ptLst>
-        <dgm:pt modelId="0" type="doc"/>
-        <dgm:pt modelId="1"/>
-        <dgm:pt modelId="2"/>
-      </dgm:ptLst>
-      <dgm:cxnLst>
-        <dgm:cxn modelId="3" srcId="0" destId="1" srcOrd="0" destOrd="0"/>
-        <dgm:cxn modelId="4" srcId="0" destId="2" srcOrd="1" destOrd="0"/>
-      </dgm:cxnLst>
-      <dgm:bg/>
-      <dgm:whole/>
-    </dgm:dataModel>
-  </dgm:styleData>
-  <dgm:clrData>
-    <dgm:dataModel>
-      <dgm:ptLst>
-        <dgm:pt modelId="0" type="doc"/>
-        <dgm:pt modelId="1"/>
-        <dgm:pt modelId="2"/>
-        <dgm:pt modelId="3"/>
-        <dgm:pt modelId="4"/>
-      </dgm:ptLst>
-      <dgm:cxnLst>
-        <dgm:cxn modelId="5" srcId="0" destId="1" srcOrd="0" destOrd="0"/>
-        <dgm:cxn modelId="6" srcId="0" destId="2" srcOrd="1" destOrd="0"/>
-        <dgm:cxn modelId="7" srcId="0" destId="3" srcOrd="2" destOrd="0"/>
-        <dgm:cxn modelId="8" srcId="0" destId="4" srcOrd="3" destOrd="0"/>
-      </dgm:cxnLst>
-      <dgm:bg/>
-      <dgm:whole/>
-    </dgm:dataModel>
-  </dgm:clrData>
-  <dgm:layoutNode name="linear">
-    <dgm:varLst>
-      <dgm:animLvl val="lvl"/>
-      <dgm:resizeHandles val="exact"/>
-    </dgm:varLst>
-    <dgm:alg type="lin">
-      <dgm:param type="linDir" val="fromT"/>
-      <dgm:param type="vertAlign" val="mid"/>
-    </dgm:alg>
-    <dgm:shape xmlns:r="http://schemas.openxmlformats.org/officeDocument/2006/relationships" r:blip="">
-      <dgm:adjLst/>
-    </dgm:shape>
-    <dgm:presOf/>
-    <dgm:constrLst>
-      <dgm:constr type="w" for="ch" forName="parentText" refType="w"/>
-      <dgm:constr type="h" for="ch" forName="parentText" refType="primFontSz" refFor="ch" refForName="parentText" fact="0.52"/>
-      <dgm:constr type="w" for="ch" forName="childText" refType="w"/>
-      <dgm:constr type="h" for="ch" forName="childText" refType="primFontSz" refFor="ch" refForName="parentText" fact="0.46"/>
-      <dgm:constr type="h" for="ch" forName="parentText" op="equ"/>
-      <dgm:constr type="primFontSz" for="ch" forName="parentText" op="equ" val="65"/>
-      <dgm:constr type="primFontSz" for="ch" forName="childText" refType="primFontSz" refFor="ch" refForName="parentText" op="equ"/>
-      <dgm:constr type="h" for="ch" forName="spacer" refType="primFontSz" refFor="ch" refForName="parentText" fact="0.08"/>
-    </dgm:constrLst>
-    <dgm:ruleLst>
-      <dgm:rule type="primFontSz" for="ch" forName="parentText" val="5" fact="NaN" max="NaN"/>
-    </dgm:ruleLst>
-    <dgm:forEach name="Name0" axis="ch" ptType="node">
-      <dgm:layoutNode name="parentText" styleLbl="node1">
-        <dgm:varLst>
-          <dgm:chMax val="0"/>
-          <dgm:bulletEnabled val="1"/>
-        </dgm:varLst>
-        <dgm:alg type="tx">
-          <dgm:param type="parTxLTRAlign" val="l"/>
-          <dgm:param type="parTxRTLAlign" val="r"/>
-        </dgm:alg>
-        <dgm:shape xmlns:r="http://schemas.openxmlformats.org/officeDocument/2006/relationships" type="roundRect" r:blip="">
-          <dgm:adjLst/>
-        </dgm:shape>
-        <dgm:presOf axis="self"/>
-        <dgm:constrLst>
-          <dgm:constr type="tMarg" refType="primFontSz" fact="0.3"/>
-          <dgm:constr type="bMarg" refType="primFontSz" fact="0.3"/>
-          <dgm:constr type="lMarg" refType="primFontSz" fact="0.3"/>
-          <dgm:constr type="rMarg" refType="primFontSz" fact="0.3"/>
-        </dgm:constrLst>
-        <dgm:ruleLst>
-          <dgm:rule type="h" val="INF" fact="NaN" max="NaN"/>
-        </dgm:ruleLst>
-      </dgm:layoutNode>
-      <dgm:choose name="Name1">
-        <dgm:if name="Name2" axis="ch" ptType="node" func="cnt" op="gte" val="1">
-          <dgm:layoutNode name="childText" styleLbl="revTx">
-            <dgm:varLst>
-              <dgm:bulletEnabled val="1"/>
-            </dgm:varLst>
-            <dgm:alg type="tx">
-              <dgm:param type="stBulletLvl" val="1"/>
-              <dgm:param type="lnSpAfChP" val="20"/>
-            </dgm:alg>
-            <dgm:shape xmlns:r="http://schemas.openxmlformats.org/officeDocument/2006/relationships" type="rect" r:blip="">
-              <dgm:adjLst/>
-            </dgm:shape>
-            <dgm:presOf axis="des" ptType="node"/>
-            <dgm:constrLst>
-              <dgm:constr type="tMarg" refType="primFontSz" fact="0.1"/>
-              <dgm:constr type="bMarg" refType="primFontSz" fact="0.1"/>
-              <dgm:constr type="lMarg" refType="w" fact="0.09"/>
-            </dgm:constrLst>
-            <dgm:ruleLst>
-              <dgm:rule type="h" val="INF" fact="NaN" max="NaN"/>
-            </dgm:ruleLst>
-          </dgm:layoutNode>
-        </dgm:if>
-        <dgm:else name="Name3">
-          <dgm:choose name="Name4">
-            <dgm:if name="Name5" axis="par ch" ptType="doc node" func="cnt" op="gte" val="2">
-              <dgm:forEach name="Name6" axis="followSib" ptType="sibTrans" cnt="1">
-                <dgm:layoutNode name="spacer">
-                  <dgm:alg type="sp"/>
-                  <dgm:shape xmlns:r="http://schemas.openxmlformats.org/officeDocument/2006/relationships" r:blip="">
-                    <dgm:adjLst/>
-                  </dgm:shape>
-                  <dgm:presOf/>
-                  <dgm:constrLst/>
-                  <dgm:ruleLst/>
-                </dgm:layoutNode>
-              </dgm:forEach>
-            </dgm:if>
-            <dgm:else name="Name7"/>
-          </dgm:choose>
-        </dgm:else>
-      </dgm:choose>
-    </dgm:forEach>
-  </dgm:layoutNode>
-</dgm:layoutDef>
-</file>
-
-<file path=ppt/diagrams/quickStyle1.xml><?xml version="1.0" encoding="utf-8"?>
-<dgm:styleDef xmlns:dgm="http://schemas.openxmlformats.org/drawingml/2006/diagram" xmlns:a="http://schemas.openxmlformats.org/drawingml/2006/main" uniqueId="urn:microsoft.com/office/officeart/2005/8/quickstyle/simple1">
-  <dgm:title val=""/>
-  <dgm:desc val=""/>
-  <dgm:catLst>
-    <dgm:cat type="simple" pri="10100"/>
-  </dgm:catLst>
-  <dgm:scene3d>
-    <a:camera prst="orthographicFront"/>
-    <a:lightRig rig="threePt" dir="t"/>
-  </dgm:scene3d>
-  <dgm:styleLbl name="node0">
-    <dgm:scene3d>
-      <a:camera prst="orthographicFront"/>
-      <a:lightRig rig="threePt" dir="t"/>
-    </dgm:scene3d>
-    <dgm:sp3d/>
-    <dgm:txPr/>
-    <dgm:style>
-      <a:lnRef idx="2">
-        <a:scrgbClr r="0" g="0" b="0"/>
-      </a:lnRef>
-      <a:fillRef idx="1">
-        <a:scrgbClr r="0" g="0" b="0"/>
-      </a:fillRef>
-      <a:effectRef idx="0">
-        <a:scrgbClr r="0" g="0" b="0"/>
-      </a:effectRef>
-      <a:fontRef idx="minor">
-        <a:schemeClr val="lt1"/>
-      </a:fontRef>
-    </dgm:style>
-  </dgm:styleLbl>
-  <dgm:styleLbl name="lnNode1">
-    <dgm:scene3d>
-      <a:camera prst="orthographicFront"/>
-      <a:lightRig rig="threePt" dir="t"/>
-    </dgm:scene3d>
-    <dgm:sp3d/>
-    <dgm:txPr/>
-    <dgm:style>
-      <a:lnRef idx="2">
-        <a:scrgbClr r="0" g="0" b="0"/>
-      </a:lnRef>
-      <a:fillRef idx="1">
-        <a:scrgbClr r="0" g="0" b="0"/>
-      </a:fillRef>
-      <a:effectRef idx="0">
-        <a:scrgbClr r="0" g="0" b="0"/>
-      </a:effectRef>
-      <a:fontRef idx="minor">
-        <a:schemeClr val="lt1"/>
-      </a:fontRef>
-    </dgm:style>
-  </dgm:styleLbl>
-  <dgm:styleLbl name="vennNode1">
-    <dgm:scene3d>
-      <a:camera prst="orthographicFront"/>
-      <a:lightRig rig="threePt" dir="t"/>
-    </dgm:scene3d>
-    <dgm:sp3d/>
-    <dgm:txPr/>
-    <dgm:style>
-      <a:lnRef idx="2">
-        <a:scrgbClr r="0" g="0" b="0"/>
-      </a:lnRef>
-      <a:fillRef idx="1">
-        <a:scrgbClr r="0" g="0" b="0"/>
-      </a:fillRef>
-      <a:effectRef idx="0">
-        <a:scrgbClr r="0" g="0" b="0"/>
-      </a:effectRef>
-      <a:fontRef idx="minor">
-        <a:schemeClr val="tx1"/>
-      </a:fontRef>
-    </dgm:style>
-  </dgm:styleLbl>
-  <dgm:styleLbl name="alignNode1">
-    <dgm:scene3d>
-      <a:camera prst="orthographicFront"/>
-      <a:lightRig rig="threePt" dir="t"/>
-    </dgm:scene3d>
-    <dgm:sp3d/>
-    <dgm:txPr/>
-    <dgm:style>
-      <a:lnRef idx="2">
-        <a:scrgbClr r="0" g="0" b="0"/>
-      </a:lnRef>
-      <a:fillRef idx="1">
-        <a:scrgbClr r="0" g="0" b="0"/>
-      </a:fillRef>
-      <a:effectRef idx="0">
-        <a:scrgbClr r="0" g="0" b="0"/>
-      </a:effectRef>
-      <a:fontRef idx="minor">
-        <a:schemeClr val="lt1"/>
-      </a:fontRef>
-    </dgm:style>
-  </dgm:styleLbl>
-  <dgm:styleLbl name="node1">
-    <dgm:scene3d>
-      <a:camera prst="orthographicFront"/>
-      <a:lightRig rig="threePt" dir="t"/>
-    </dgm:scene3d>
-    <dgm:sp3d/>
-    <dgm:txPr/>
-    <dgm:style>
-      <a:lnRef idx="2">
-        <a:scrgbClr r="0" g="0" b="0"/>
-      </a:lnRef>
-      <a:fillRef idx="1">
-        <a:scrgbClr r="0" g="0" b="0"/>
-      </a:fillRef>
-      <a:effectRef idx="0">
-        <a:scrgbClr r="0" g="0" b="0"/>
-      </a:effectRef>
-      <a:fontRef idx="minor">
-        <a:schemeClr val="lt1"/>
-      </a:fontRef>
-    </dgm:style>
-  </dgm:styleLbl>
-  <dgm:styleLbl name="node2">
-    <dgm:scene3d>
-      <a:camera prst="orthographicFront"/>
-      <a:lightRig rig="threePt" dir="t"/>
-    </dgm:scene3d>
-    <dgm:sp3d/>
-    <dgm:txPr/>
-    <dgm:style>
-      <a:lnRef idx="2">
-        <a:scrgbClr r="0" g="0" b="0"/>
-      </a:lnRef>
-      <a:fillRef idx="1">
-        <a:scrgbClr r="0" g="0" b="0"/>
-      </a:fillRef>
-      <a:effectRef idx="0">
-        <a:scrgbClr r="0" g="0" b="0"/>
-      </a:effectRef>
-      <a:fontRef idx="minor">
-        <a:schemeClr val="lt1"/>
-      </a:fontRef>
-    </dgm:style>
-  </dgm:styleLbl>
-  <dgm:styleLbl name="node3">
-    <dgm:scene3d>
-      <a:camera prst="orthographicFront"/>
-      <a:lightRig rig="threePt" dir="t"/>
-    </dgm:scene3d>
-    <dgm:sp3d/>
-    <dgm:txPr/>
-    <dgm:style>
-      <a:lnRef idx="2">
-        <a:scrgbClr r="0" g="0" b="0"/>
-      </a:lnRef>
-      <a:fillRef idx="1">
-        <a:scrgbClr r="0" g="0" b="0"/>
-      </a:fillRef>
-      <a:effectRef idx="0">
-        <a:scrgbClr r="0" g="0" b="0"/>
-      </a:effectRef>
-      <a:fontRef idx="minor">
-        <a:schemeClr val="lt1"/>
-      </a:fontRef>
-    </dgm:style>
-  </dgm:styleLbl>
-  <dgm:styleLbl name="node4">
-    <dgm:scene3d>
-      <a:camera prst="orthographicFront"/>
-      <a:lightRig rig="threePt" dir="t"/>
-    </dgm:scene3d>
-    <dgm:sp3d/>
-    <dgm:txPr/>
-    <dgm:style>
-      <a:lnRef idx="2">
-        <a:scrgbClr r="0" g="0" b="0"/>
-      </a:lnRef>
-      <a:fillRef idx="1">
-        <a:scrgbClr r="0" g="0" b="0"/>
-      </a:fillRef>
-      <a:effectRef idx="0">
-        <a:scrgbClr r="0" g="0" b="0"/>
-      </a:effectRef>
-      <a:fontRef idx="minor">
-        <a:schemeClr val="lt1"/>
-      </a:fontRef>
-    </dgm:style>
-  </dgm:styleLbl>
-  <dgm:styleLbl name="fgImgPlace1">
-    <dgm:scene3d>
-      <a:camera prst="orthographicFront"/>
-      <a:lightRig rig="threePt" dir="t"/>
-    </dgm:scene3d>
-    <dgm:sp3d/>
-    <dgm:txPr/>
-    <dgm:style>
-      <a:lnRef idx="2">
-        <a:scrgbClr r="0" g="0" b="0"/>
-      </a:lnRef>
-      <a:fillRef idx="1">
-        <a:scrgbClr r="0" g="0" b="0"/>
-      </a:fillRef>
-      <a:effectRef idx="0">
-        <a:scrgbClr r="0" g="0" b="0"/>
-      </a:effectRef>
-      <a:fontRef idx="minor"/>
-    </dgm:style>
-  </dgm:styleLbl>
-  <dgm:styleLbl name="alignImgPlace1">
-    <dgm:scene3d>
-      <a:camera prst="orthographicFront"/>
-      <a:lightRig rig="threePt" dir="t"/>
-    </dgm:scene3d>
-    <dgm:sp3d/>
-    <dgm:txPr/>
-    <dgm:style>
-      <a:lnRef idx="2">
-        <a:scrgbClr r="0" g="0" b="0"/>
-      </a:lnRef>
-      <a:fillRef idx="1">
-        <a:scrgbClr r="0" g="0" b="0"/>
-      </a:fillRef>
-      <a:effectRef idx="0">
-        <a:scrgbClr r="0" g="0" b="0"/>
-      </a:effectRef>
-      <a:fontRef idx="minor"/>
-    </dgm:style>
-  </dgm:styleLbl>
-  <dgm:styleLbl name="bgImgPlace1">
-    <dgm:scene3d>
-      <a:camera prst="orthographicFront"/>
-      <a:lightRig rig="threePt" dir="t"/>
-    </dgm:scene3d>
-    <dgm:sp3d/>
-    <dgm:txPr/>
-    <dgm:style>
-      <a:lnRef idx="2">
-        <a:scrgbClr r="0" g="0" b="0"/>
-      </a:lnRef>
-      <a:fillRef idx="1">
-        <a:scrgbClr r="0" g="0" b="0"/>
-      </a:fillRef>
-      <a:effectRef idx="0">
-        <a:scrgbClr r="0" g="0" b="0"/>
-      </a:effectRef>
-      <a:fontRef idx="minor"/>
-    </dgm:style>
-  </dgm:styleLbl>
-  <dgm:styleLbl name="sibTrans2D1">
-    <dgm:scene3d>
-      <a:camera prst="orthographicFront"/>
-      <a:lightRig rig="threePt" dir="t"/>
-    </dgm:scene3d>
-    <dgm:sp3d/>
-    <dgm:txPr/>
-    <dgm:style>
-      <a:lnRef idx="0">
-        <a:scrgbClr r="0" g="0" b="0"/>
-      </a:lnRef>
-      <a:fillRef idx="1">
-        <a:scrgbClr r="0" g="0" b="0"/>
-      </a:fillRef>
-      <a:effectRef idx="0">
-        <a:scrgbClr r="0" g="0" b="0"/>
-      </a:effectRef>
-      <a:fontRef idx="minor">
-        <a:schemeClr val="lt1"/>
-      </a:fontRef>
-    </dgm:style>
-  </dgm:styleLbl>
-  <dgm:styleLbl name="fgSibTrans2D1">
-    <dgm:scene3d>
-      <a:camera prst="orthographicFront"/>
-      <a:lightRig rig="threePt" dir="t"/>
-    </dgm:scene3d>
-    <dgm:sp3d/>
-    <dgm:txPr/>
-    <dgm:style>
-      <a:lnRef idx="0">
-        <a:scrgbClr r="0" g="0" b="0"/>
-      </a:lnRef>
-      <a:fillRef idx="1">
-        <a:scrgbClr r="0" g="0" b="0"/>
-      </a:fillRef>
-      <a:effectRef idx="0">
-        <a:scrgbClr r="0" g="0" b="0"/>
-      </a:effectRef>
-      <a:fontRef idx="minor">
-        <a:schemeClr val="lt1"/>
-      </a:fontRef>
-    </dgm:style>
-  </dgm:styleLbl>
-  <dgm:styleLbl name="bgSibTrans2D1">
-    <dgm:scene3d>
-      <a:camera prst="orthographicFront"/>
-      <a:lightRig rig="threePt" dir="t"/>
-    </dgm:scene3d>
-    <dgm:sp3d/>
-    <dgm:txPr/>
-    <dgm:style>
-      <a:lnRef idx="0">
-        <a:scrgbClr r="0" g="0" b="0"/>
-      </a:lnRef>
-      <a:fillRef idx="1">
-        <a:scrgbClr r="0" g="0" b="0"/>
-      </a:fillRef>
-      <a:effectRef idx="0">
-        <a:scrgbClr r="0" g="0" b="0"/>
-      </a:effectRef>
-      <a:fontRef idx="minor">
-        <a:schemeClr val="lt1"/>
-      </a:fontRef>
-    </dgm:style>
-  </dgm:styleLbl>
-  <dgm:styleLbl name="sibTrans1D1">
-    <dgm:scene3d>
-      <a:camera prst="orthographicFront"/>
-      <a:lightRig rig="threePt" dir="t"/>
-    </dgm:scene3d>
-    <dgm:sp3d/>
-    <dgm:txPr/>
-    <dgm:style>
-      <a:lnRef idx="1">
-        <a:scrgbClr r="0" g="0" b="0"/>
-      </a:lnRef>
-      <a:fillRef idx="0">
-        <a:scrgbClr r="0" g="0" b="0"/>
-      </a:fillRef>
-      <a:effectRef idx="0">
-        <a:scrgbClr r="0" g="0" b="0"/>
-      </a:effectRef>
-      <a:fontRef idx="minor"/>
-    </dgm:style>
-  </dgm:styleLbl>
-  <dgm:styleLbl name="callout">
-    <dgm:scene3d>
-      <a:camera prst="orthographicFront"/>
-      <a:lightRig rig="threePt" dir="t"/>
-    </dgm:scene3d>
-    <dgm:sp3d/>
-    <dgm:txPr/>
-    <dgm:style>
-      <a:lnRef idx="2">
-        <a:scrgbClr r="0" g="0" b="0"/>
-      </a:lnRef>
-      <a:fillRef idx="1">
-        <a:scrgbClr r="0" g="0" b="0"/>
-      </a:fillRef>
-      <a:effectRef idx="0">
-        <a:scrgbClr r="0" g="0" b="0"/>
-      </a:effectRef>
-      <a:fontRef idx="minor"/>
-    </dgm:style>
-  </dgm:styleLbl>
-  <dgm:styleLbl name="asst0">
-    <dgm:scene3d>
-      <a:camera prst="orthographicFront"/>
-      <a:lightRig rig="threePt" dir="t"/>
-    </dgm:scene3d>
-    <dgm:sp3d/>
-    <dgm:txPr/>
-    <dgm:style>
-      <a:lnRef idx="2">
-        <a:scrgbClr r="0" g="0" b="0"/>
-      </a:lnRef>
-      <a:fillRef idx="1">
-        <a:scrgbClr r="0" g="0" b="0"/>
-      </a:fillRef>
-      <a:effectRef idx="0">
-        <a:scrgbClr r="0" g="0" b="0"/>
-      </a:effectRef>
-      <a:fontRef idx="minor">
-        <a:schemeClr val="lt1"/>
-      </a:fontRef>
-    </dgm:style>
-  </dgm:styleLbl>
-  <dgm:styleLbl name="asst1">
-    <dgm:scene3d>
-      <a:camera prst="orthographicFront"/>
-      <a:lightRig rig="threePt" dir="t"/>
-    </dgm:scene3d>
-    <dgm:sp3d/>
-    <dgm:txPr/>
-    <dgm:style>
-      <a:lnRef idx="2">
-        <a:scrgbClr r="0" g="0" b="0"/>
-      </a:lnRef>
-      <a:fillRef idx="1">
-        <a:scrgbClr r="0" g="0" b="0"/>
-      </a:fillRef>
-      <a:effectRef idx="0">
-        <a:scrgbClr r="0" g="0" b="0"/>
-      </a:effectRef>
-      <a:fontRef idx="minor">
-        <a:schemeClr val="lt1"/>
-      </a:fontRef>
-    </dgm:style>
-  </dgm:styleLbl>
-  <dgm:styleLbl name="asst2">
-    <dgm:scene3d>
-      <a:camera prst="orthographicFront"/>
-      <a:lightRig rig="threePt" dir="t"/>
-    </dgm:scene3d>
-    <dgm:sp3d/>
-    <dgm:txPr/>
-    <dgm:style>
-      <a:lnRef idx="2">
-        <a:scrgbClr r="0" g="0" b="0"/>
-      </a:lnRef>
-      <a:fillRef idx="1">
-        <a:scrgbClr r="0" g="0" b="0"/>
-      </a:fillRef>
-      <a:effectRef idx="0">
-        <a:scrgbClr r="0" g="0" b="0"/>
-      </a:effectRef>
-      <a:fontRef idx="minor">
-        <a:schemeClr val="lt1"/>
-      </a:fontRef>
-    </dgm:style>
-  </dgm:styleLbl>
-  <dgm:styleLbl name="asst3">
-    <dgm:scene3d>
-      <a:camera prst="orthographicFront"/>
-      <a:lightRig rig="threePt" dir="t"/>
-    </dgm:scene3d>
-    <dgm:sp3d/>
-    <dgm:txPr/>
-    <dgm:style>
-      <a:lnRef idx="2">
-        <a:scrgbClr r="0" g="0" b="0"/>
-      </a:lnRef>
-      <a:fillRef idx="1">
-        <a:scrgbClr r="0" g="0" b="0"/>
-      </a:fillRef>
-      <a:effectRef idx="0">
-        <a:scrgbClr r="0" g="0" b="0"/>
-      </a:effectRef>
-      <a:fontRef idx="minor">
-        <a:schemeClr val="lt1"/>
-      </a:fontRef>
-    </dgm:style>
-  </dgm:styleLbl>
-  <dgm:styleLbl name="asst4">
-    <dgm:scene3d>
-      <a:camera prst="orthographicFront"/>
-      <a:lightRig rig="threePt" dir="t"/>
-    </dgm:scene3d>
-    <dgm:sp3d/>
-    <dgm:txPr/>
-    <dgm:style>
-      <a:lnRef idx="2">
-        <a:scrgbClr r="0" g="0" b="0"/>
-      </a:lnRef>
-      <a:fillRef idx="1">
-        <a:scrgbClr r="0" g="0" b="0"/>
-      </a:fillRef>
-      <a:effectRef idx="0">
-        <a:scrgbClr r="0" g="0" b="0"/>
-      </a:effectRef>
-      <a:fontRef idx="minor">
-        <a:schemeClr val="lt1"/>
-      </a:fontRef>
-    </dgm:style>
-  </dgm:styleLbl>
-  <dgm:styleLbl name="parChTrans2D1">
-    <dgm:scene3d>
-      <a:camera prst="orthographicFront"/>
-      <a:lightRig rig="threePt" dir="t"/>
-    </dgm:scene3d>
-    <dgm:sp3d/>
-    <dgm:txPr/>
-    <dgm:style>
-      <a:lnRef idx="2">
-        <a:scrgbClr r="0" g="0" b="0"/>
-      </a:lnRef>
-      <a:fillRef idx="1">
-        <a:scrgbClr r="0" g="0" b="0"/>
-      </a:fillRef>
-      <a:effectRef idx="0">
-        <a:scrgbClr r="0" g="0" b="0"/>
-      </a:effectRef>
-      <a:fontRef idx="minor">
-        <a:schemeClr val="lt1"/>
-      </a:fontRef>
-    </dgm:style>
-  </dgm:styleLbl>
-  <dgm:styleLbl name="parChTrans2D2">
-    <dgm:scene3d>
-      <a:camera prst="orthographicFront"/>
-      <a:lightRig rig="threePt" dir="t"/>
-    </dgm:scene3d>
-    <dgm:sp3d/>
-    <dgm:txPr/>
-    <dgm:style>
-      <a:lnRef idx="2">
-        <a:scrgbClr r="0" g="0" b="0"/>
-      </a:lnRef>
-      <a:fillRef idx="1">
-        <a:scrgbClr r="0" g="0" b="0"/>
-      </a:fillRef>
-      <a:effectRef idx="0">
-        <a:scrgbClr r="0" g="0" b="0"/>
-      </a:effectRef>
-      <a:fontRef idx="minor">
-        <a:schemeClr val="lt1"/>
-      </a:fontRef>
-    </dgm:style>
-  </dgm:styleLbl>
-  <dgm:styleLbl name="parChTrans2D3">
-    <dgm:scene3d>
-      <a:camera prst="orthographicFront"/>
-      <a:lightRig rig="threePt" dir="t"/>
-    </dgm:scene3d>
-    <dgm:sp3d/>
-    <dgm:txPr/>
-    <dgm:style>
-      <a:lnRef idx="2">
-        <a:scrgbClr r="0" g="0" b="0"/>
-      </a:lnRef>
-      <a:fillRef idx="1">
-        <a:scrgbClr r="0" g="0" b="0"/>
-      </a:fillRef>
-      <a:effectRef idx="0">
-        <a:scrgbClr r="0" g="0" b="0"/>
-      </a:effectRef>
-      <a:fontRef idx="minor">
-        <a:schemeClr val="lt1"/>
-      </a:fontRef>
-    </dgm:style>
-  </dgm:styleLbl>
-  <dgm:styleLbl name="parChTrans2D4">
-    <dgm:scene3d>
-      <a:camera prst="orthographicFront"/>
-      <a:lightRig rig="threePt" dir="t"/>
-    </dgm:scene3d>
-    <dgm:sp3d/>
-    <dgm:txPr/>
-    <dgm:style>
-      <a:lnRef idx="2">
-        <a:scrgbClr r="0" g="0" b="0"/>
-      </a:lnRef>
-      <a:fillRef idx="1">
-        <a:scrgbClr r="0" g="0" b="0"/>
-      </a:fillRef>
-      <a:effectRef idx="0">
-        <a:scrgbClr r="0" g="0" b="0"/>
-      </a:effectRef>
-      <a:fontRef idx="minor">
-        <a:schemeClr val="lt1"/>
-      </a:fontRef>
-    </dgm:style>
-  </dgm:styleLbl>
-  <dgm:styleLbl name="parChTrans1D1">
-    <dgm:scene3d>
-      <a:camera prst="orthographicFront"/>
-      <a:lightRig rig="threePt" dir="t"/>
-    </dgm:scene3d>
-    <dgm:sp3d/>
-    <dgm:txPr/>
-    <dgm:style>
-      <a:lnRef idx="2">
-        <a:scrgbClr r="0" g="0" b="0"/>
-      </a:lnRef>
-      <a:fillRef idx="0">
-        <a:scrgbClr r="0" g="0" b="0"/>
-      </a:fillRef>
-      <a:effectRef idx="0">
-        <a:scrgbClr r="0" g="0" b="0"/>
-      </a:effectRef>
-      <a:fontRef idx="minor"/>
-    </dgm:style>
-  </dgm:styleLbl>
-  <dgm:styleLbl name="parChTrans1D2">
-    <dgm:scene3d>
-      <a:camera prst="orthographicFront"/>
-      <a:lightRig rig="threePt" dir="t"/>
-    </dgm:scene3d>
-    <dgm:sp3d/>
-    <dgm:txPr/>
-    <dgm:style>
-      <a:lnRef idx="2">
-        <a:scrgbClr r="0" g="0" b="0"/>
-      </a:lnRef>
-      <a:fillRef idx="0">
-        <a:scrgbClr r="0" g="0" b="0"/>
-      </a:fillRef>
-      <a:effectRef idx="0">
-        <a:scrgbClr r="0" g="0" b="0"/>
-      </a:effectRef>
-      <a:fontRef idx="minor"/>
-    </dgm:style>
-  </dgm:styleLbl>
-  <dgm:styleLbl name="parChTrans1D3">
-    <dgm:scene3d>
-      <a:camera prst="orthographicFront"/>
-      <a:lightRig rig="threePt" dir="t"/>
-    </dgm:scene3d>
-    <dgm:sp3d/>
-    <dgm:txPr/>
-    <dgm:style>
-      <a:lnRef idx="2">
-        <a:scrgbClr r="0" g="0" b="0"/>
-      </a:lnRef>
-      <a:fillRef idx="0">
-        <a:scrgbClr r="0" g="0" b="0"/>
-      </a:fillRef>
-      <a:effectRef idx="0">
-        <a:scrgbClr r="0" g="0" b="0"/>
-      </a:effectRef>
-      <a:fontRef idx="minor"/>
-    </dgm:style>
-  </dgm:styleLbl>
-  <dgm:styleLbl name="parChTrans1D4">
-    <dgm:scene3d>
-      <a:camera prst="orthographicFront"/>
-      <a:lightRig rig="threePt" dir="t"/>
-    </dgm:scene3d>
-    <dgm:sp3d/>
-    <dgm:txPr/>
-    <dgm:style>
-      <a:lnRef idx="2">
-        <a:scrgbClr r="0" g="0" b="0"/>
-      </a:lnRef>
-      <a:fillRef idx="0">
-        <a:scrgbClr r="0" g="0" b="0"/>
-      </a:fillRef>
-      <a:effectRef idx="0">
-        <a:scrgbClr r="0" g="0" b="0"/>
-      </a:effectRef>
-      <a:fontRef idx="minor"/>
-    </dgm:style>
-  </dgm:styleLbl>
-  <dgm:styleLbl name="fgAcc1">
-    <dgm:scene3d>
-      <a:camera prst="orthographicFront"/>
-      <a:lightRig rig="threePt" dir="t"/>
-    </dgm:scene3d>
-    <dgm:sp3d/>
-    <dgm:txPr/>
-    <dgm:style>
-      <a:lnRef idx="2">
-        <a:scrgbClr r="0" g="0" b="0"/>
-      </a:lnRef>
-      <a:fillRef idx="1">
-        <a:scrgbClr r="0" g="0" b="0"/>
-      </a:fillRef>
-      <a:effectRef idx="0">
-        <a:scrgbClr r="0" g="0" b="0"/>
-      </a:effectRef>
-      <a:fontRef idx="minor"/>
-    </dgm:style>
-  </dgm:styleLbl>
-  <dgm:styleLbl name="conFgAcc1">
-    <dgm:scene3d>
-      <a:camera prst="orthographicFront"/>
-      <a:lightRig rig="threePt" dir="t"/>
-    </dgm:scene3d>
-    <dgm:sp3d/>
-    <dgm:txPr/>
-    <dgm:style>
-      <a:lnRef idx="2">
-        <a:scrgbClr r="0" g="0" b="0"/>
-      </a:lnRef>
-      <a:fillRef idx="1">
-        <a:scrgbClr r="0" g="0" b="0"/>
-      </a:fillRef>
-      <a:effectRef idx="0">
-        <a:scrgbClr r="0" g="0" b="0"/>
-      </a:effectRef>
-      <a:fontRef idx="minor"/>
-    </dgm:style>
-  </dgm:styleLbl>
-  <dgm:styleLbl name="alignAcc1">
-    <dgm:scene3d>
-      <a:camera prst="orthographicFront"/>
-      <a:lightRig rig="threePt" dir="t"/>
-    </dgm:scene3d>
-    <dgm:sp3d/>
-    <dgm:txPr/>
-    <dgm:style>
-      <a:lnRef idx="2">
-        <a:scrgbClr r="0" g="0" b="0"/>
-      </a:lnRef>
-      <a:fillRef idx="1">
-        <a:scrgbClr r="0" g="0" b="0"/>
-      </a:fillRef>
-      <a:effectRef idx="0">
-        <a:scrgbClr r="0" g="0" b="0"/>
-      </a:effectRef>
-      <a:fontRef idx="minor"/>
-    </dgm:style>
-  </dgm:styleLbl>
-  <dgm:styleLbl name="trAlignAcc1">
-    <dgm:scene3d>
-      <a:camera prst="orthographicFront"/>
-      <a:lightRig rig="threePt" dir="t"/>
-    </dgm:scene3d>
-    <dgm:sp3d/>
-    <dgm:txPr/>
-    <dgm:style>
-      <a:lnRef idx="1">
-        <a:scrgbClr r="0" g="0" b="0"/>
-      </a:lnRef>
-      <a:fillRef idx="1">
-        <a:scrgbClr r="0" g="0" b="0"/>
-      </a:fillRef>
-      <a:effectRef idx="0">
-        <a:scrgbClr r="0" g="0" b="0"/>
-      </a:effectRef>
-      <a:fontRef idx="minor"/>
-    </dgm:style>
-  </dgm:styleLbl>
-  <dgm:styleLbl name="bgAcc1">
-    <dgm:scene3d>
-      <a:camera prst="orthographicFront"/>
-      <a:lightRig rig="threePt" dir="t"/>
-    </dgm:scene3d>
-    <dgm:sp3d/>
-    <dgm:txPr/>
-    <dgm:style>
-      <a:lnRef idx="2">
-        <a:scrgbClr r="0" g="0" b="0"/>
-      </a:lnRef>
-      <a:fillRef idx="1">
-        <a:scrgbClr r="0" g="0" b="0"/>
-      </a:fillRef>
-      <a:effectRef idx="0">
-        <a:scrgbClr r="0" g="0" b="0"/>
-      </a:effectRef>
-      <a:fontRef idx="minor"/>
-    </dgm:style>
-  </dgm:styleLbl>
-  <dgm:styleLbl name="solidFgAcc1">
-    <dgm:scene3d>
-      <a:camera prst="orthographicFront"/>
-      <a:lightRig rig="threePt" dir="t"/>
-    </dgm:scene3d>
-    <dgm:sp3d/>
-    <dgm:txPr/>
-    <dgm:style>
-      <a:lnRef idx="2">
-        <a:scrgbClr r="0" g="0" b="0"/>
-      </a:lnRef>
-      <a:fillRef idx="1">
-        <a:scrgbClr r="0" g="0" b="0"/>
-      </a:fillRef>
-      <a:effectRef idx="0">
-        <a:scrgbClr r="0" g="0" b="0"/>
-      </a:effectRef>
-      <a:fontRef idx="minor"/>
-    </dgm:style>
-  </dgm:styleLbl>
-  <dgm:styleLbl name="solidAlignAcc1">
-    <dgm:scene3d>
-      <a:camera prst="orthographicFront"/>
-      <a:lightRig rig="threePt" dir="t"/>
-    </dgm:scene3d>
-    <dgm:sp3d/>
-    <dgm:txPr/>
-    <dgm:style>
-      <a:lnRef idx="2">
-        <a:scrgbClr r="0" g="0" b="0"/>
-      </a:lnRef>
-      <a:fillRef idx="1">
-        <a:scrgbClr r="0" g="0" b="0"/>
-      </a:fillRef>
-      <a:effectRef idx="0">
-        <a:scrgbClr r="0" g="0" b="0"/>
-      </a:effectRef>
-      <a:fontRef idx="minor"/>
-    </dgm:style>
-  </dgm:styleLbl>
-  <dgm:styleLbl name="solidBgAcc1">
-    <dgm:scene3d>
-      <a:camera prst="orthographicFront"/>
-      <a:lightRig rig="threePt" dir="t"/>
-    </dgm:scene3d>
-    <dgm:sp3d/>
-    <dgm:txPr/>
-    <dgm:style>
-      <a:lnRef idx="2">
-        <a:scrgbClr r="0" g="0" b="0"/>
-      </a:lnRef>
-      <a:fillRef idx="1">
-        <a:scrgbClr r="0" g="0" b="0"/>
-      </a:fillRef>
-      <a:effectRef idx="0">
-        <a:scrgbClr r="0" g="0" b="0"/>
-      </a:effectRef>
-      <a:fontRef idx="minor"/>
-    </dgm:style>
-  </dgm:styleLbl>
-  <dgm:styleLbl name="fgAccFollowNode1">
-    <dgm:scene3d>
-      <a:camera prst="orthographicFront"/>
-      <a:lightRig rig="threePt" dir="t"/>
-    </dgm:scene3d>
-    <dgm:sp3d/>
-    <dgm:txPr/>
-    <dgm:style>
-      <a:lnRef idx="2">
-        <a:scrgbClr r="0" g="0" b="0"/>
-      </a:lnRef>
-      <a:fillRef idx="1">
-        <a:scrgbClr r="0" g="0" b="0"/>
-      </a:fillRef>
-      <a:effectRef idx="0">
-        <a:scrgbClr r="0" g="0" b="0"/>
-      </a:effectRef>
-      <a:fontRef idx="minor"/>
-    </dgm:style>
-  </dgm:styleLbl>
-  <dgm:styleLbl name="alignAccFollowNode1">
-    <dgm:scene3d>
-      <a:camera prst="orthographicFront"/>
-      <a:lightRig rig="threePt" dir="t"/>
-    </dgm:scene3d>
-    <dgm:sp3d/>
-    <dgm:txPr/>
-    <dgm:style>
-      <a:lnRef idx="2">
-        <a:scrgbClr r="0" g="0" b="0"/>
-      </a:lnRef>
-      <a:fillRef idx="1">
-        <a:scrgbClr r="0" g="0" b="0"/>
-      </a:fillRef>
-      <a:effectRef idx="0">
-        <a:scrgbClr r="0" g="0" b="0"/>
-      </a:effectRef>
-      <a:fontRef idx="minor"/>
-    </dgm:style>
-  </dgm:styleLbl>
-  <dgm:styleLbl name="bgAccFollowNode1">
-    <dgm:scene3d>
-      <a:camera prst="orthographicFront"/>
-      <a:lightRig rig="threePt" dir="t"/>
-    </dgm:scene3d>
-    <dgm:sp3d/>
-    <dgm:txPr/>
-    <dgm:style>
-      <a:lnRef idx="2">
-        <a:scrgbClr r="0" g="0" b="0"/>
-      </a:lnRef>
-      <a:fillRef idx="1">
-        <a:scrgbClr r="0" g="0" b="0"/>
-      </a:fillRef>
-      <a:effectRef idx="0">
-        <a:scrgbClr r="0" g="0" b="0"/>
-      </a:effectRef>
-      <a:fontRef idx="minor"/>
-    </dgm:style>
-  </dgm:styleLbl>
-  <dgm:styleLbl name="fgAcc0">
-    <dgm:scene3d>
-      <a:camera prst="orthographicFront"/>
-      <a:lightRig rig="threePt" dir="t"/>
-    </dgm:scene3d>
-    <dgm:sp3d/>
-    <dgm:txPr/>
-    <dgm:style>
-      <a:lnRef idx="2">
-        <a:scrgbClr r="0" g="0" b="0"/>
-      </a:lnRef>
-      <a:fillRef idx="1">
-        <a:scrgbClr r="0" g="0" b="0"/>
-      </a:fillRef>
-      <a:effectRef idx="0">
-        <a:scrgbClr r="0" g="0" b="0"/>
-      </a:effectRef>
-      <a:fontRef idx="minor"/>
-    </dgm:style>
-  </dgm:styleLbl>
-  <dgm:styleLbl name="fgAcc2">
-    <dgm:scene3d>
-      <a:camera prst="orthographicFront"/>
-      <a:lightRig rig="threePt" dir="t"/>
-    </dgm:scene3d>
-    <dgm:sp3d/>
-    <dgm:txPr/>
-    <dgm:style>
-      <a:lnRef idx="2">
-        <a:scrgbClr r="0" g="0" b="0"/>
-      </a:lnRef>
-      <a:fillRef idx="1">
-        <a:scrgbClr r="0" g="0" b="0"/>
-      </a:fillRef>
-      <a:effectRef idx="0">
-        <a:scrgbClr r="0" g="0" b="0"/>
-      </a:effectRef>
-      <a:fontRef idx="minor"/>
-    </dgm:style>
-  </dgm:styleLbl>
-  <dgm:styleLbl name="fgAcc3">
-    <dgm:scene3d>
-      <a:camera prst="orthographicFront"/>
-      <a:lightRig rig="threePt" dir="t"/>
-    </dgm:scene3d>
-    <dgm:sp3d/>
-    <dgm:txPr/>
-    <dgm:style>
-      <a:lnRef idx="2">
-        <a:scrgbClr r="0" g="0" b="0"/>
-      </a:lnRef>
-      <a:fillRef idx="1">
-        <a:scrgbClr r="0" g="0" b="0"/>
-      </a:fillRef>
-      <a:effectRef idx="0">
-        <a:scrgbClr r="0" g="0" b="0"/>
-      </a:effectRef>
-      <a:fontRef idx="minor"/>
-    </dgm:style>
-  </dgm:styleLbl>
-  <dgm:styleLbl name="fgAcc4">
-    <dgm:scene3d>
-      <a:camera prst="orthographicFront"/>
-      <a:lightRig rig="threePt" dir="t"/>
-    </dgm:scene3d>
-    <dgm:sp3d/>
-    <dgm:txPr/>
-    <dgm:style>
-      <a:lnRef idx="2">
-        <a:scrgbClr r="0" g="0" b="0"/>
-      </a:lnRef>
-      <a:fillRef idx="1">
-        <a:scrgbClr r="0" g="0" b="0"/>
-      </a:fillRef>
-      <a:effectRef idx="0">
-        <a:scrgbClr r="0" g="0" b="0"/>
-      </a:effectRef>
-      <a:fontRef idx="minor"/>
-    </dgm:style>
-  </dgm:styleLbl>
-  <dgm:styleLbl name="bgShp">
-    <dgm:scene3d>
-      <a:camera prst="orthographicFront"/>
-      <a:lightRig rig="threePt" dir="t"/>
-    </dgm:scene3d>
-    <dgm:sp3d/>
-    <dgm:txPr/>
-    <dgm:style>
-      <a:lnRef idx="0">
-        <a:scrgbClr r="0" g="0" b="0"/>
-      </a:lnRef>
-      <a:fillRef idx="1">
-        <a:scrgbClr r="0" g="0" b="0"/>
-      </a:fillRef>
-      <a:effectRef idx="0">
-        <a:scrgbClr r="0" g="0" b="0"/>
-      </a:effectRef>
-      <a:fontRef idx="minor"/>
-    </dgm:style>
-  </dgm:styleLbl>
-  <dgm:styleLbl name="dkBgShp">
-    <dgm:scene3d>
-      <a:camera prst="orthographicFront"/>
-      <a:lightRig rig="threePt" dir="t"/>
-    </dgm:scene3d>
-    <dgm:sp3d/>
-    <dgm:txPr/>
-    <dgm:style>
-      <a:lnRef idx="0">
-        <a:scrgbClr r="0" g="0" b="0"/>
-      </a:lnRef>
-      <a:fillRef idx="1">
-        <a:scrgbClr r="0" g="0" b="0"/>
-      </a:fillRef>
-      <a:effectRef idx="0">
-        <a:scrgbClr r="0" g="0" b="0"/>
-      </a:effectRef>
-      <a:fontRef idx="minor"/>
-    </dgm:style>
-  </dgm:styleLbl>
-  <dgm:styleLbl name="trBgShp">
-    <dgm:scene3d>
-      <a:camera prst="orthographicFront"/>
-      <a:lightRig rig="threePt" dir="t"/>
-    </dgm:scene3d>
-    <dgm:sp3d/>
-    <dgm:txPr/>
-    <dgm:style>
-      <a:lnRef idx="0">
-        <a:scrgbClr r="0" g="0" b="0"/>
-      </a:lnRef>
-      <a:fillRef idx="1">
-        <a:scrgbClr r="0" g="0" b="0"/>
-      </a:fillRef>
-      <a:effectRef idx="0">
-        <a:scrgbClr r="0" g="0" b="0"/>
-      </a:effectRef>
-      <a:fontRef idx="minor"/>
-    </dgm:style>
-  </dgm:styleLbl>
-  <dgm:styleLbl name="fgShp">
-    <dgm:scene3d>
-      <a:camera prst="orthographicFront"/>
-      <a:lightRig rig="threePt" dir="t"/>
-    </dgm:scene3d>
-    <dgm:sp3d/>
-    <dgm:txPr/>
-    <dgm:style>
-      <a:lnRef idx="2">
-        <a:scrgbClr r="0" g="0" b="0"/>
-      </a:lnRef>
-      <a:fillRef idx="1">
-        <a:scrgbClr r="0" g="0" b="0"/>
-      </a:fillRef>
-      <a:effectRef idx="0">
-        <a:scrgbClr r="0" g="0" b="0"/>
-      </a:effectRef>
-      <a:fontRef idx="minor"/>
-    </dgm:style>
-  </dgm:styleLbl>
-  <dgm:styleLbl name="revTx">
-    <dgm:scene3d>
-      <a:camera prst="orthographicFront"/>
-      <a:lightRig rig="threePt" dir="t"/>
-    </dgm:scene3d>
-    <dgm:sp3d/>
-    <dgm:txPr/>
-    <dgm:style>
-      <a:lnRef idx="0">
-        <a:scrgbClr r="0" g="0" b="0"/>
-      </a:lnRef>
-      <a:fillRef idx="0">
-        <a:scrgbClr r="0" g="0" b="0"/>
-      </a:fillRef>
-      <a:effectRef idx="0">
-        <a:scrgbClr r="0" g="0" b="0"/>
-      </a:effectRef>
-      <a:fontRef idx="minor"/>
-    </dgm:style>
-  </dgm:styleLbl>
-</dgm:styleDef>
 </file>
 
 <file path=ppt/slideLayouts/slideLayout1.xml><?xml version="1.0" encoding="utf-8"?>
@@ -3163,7 +259,7 @@
           <a:p>
             <a:fld id="{A9AE9797-A1F7-4672-94D1-D234AB59CDFE}" type="datetimeFigureOut">
               <a:rPr lang="en-US" smtClean="0"/>
-              <a:t>11/1/2023</a:t>
+              <a:t>11/24/2023</a:t>
             </a:fld>
             <a:endParaRPr lang="en-US"/>
           </a:p>
@@ -3361,7 +457,7 @@
           <a:p>
             <a:fld id="{A9AE9797-A1F7-4672-94D1-D234AB59CDFE}" type="datetimeFigureOut">
               <a:rPr lang="en-US" smtClean="0"/>
-              <a:t>11/1/2023</a:t>
+              <a:t>11/24/2023</a:t>
             </a:fld>
             <a:endParaRPr lang="en-US"/>
           </a:p>
@@ -3569,7 +665,7 @@
           <a:p>
             <a:fld id="{A9AE9797-A1F7-4672-94D1-D234AB59CDFE}" type="datetimeFigureOut">
               <a:rPr lang="en-US" smtClean="0"/>
-              <a:t>11/1/2023</a:t>
+              <a:t>11/24/2023</a:t>
             </a:fld>
             <a:endParaRPr lang="en-US"/>
           </a:p>
@@ -3767,7 +863,7 @@
           <a:p>
             <a:fld id="{A9AE9797-A1F7-4672-94D1-D234AB59CDFE}" type="datetimeFigureOut">
               <a:rPr lang="en-US" smtClean="0"/>
-              <a:t>11/1/2023</a:t>
+              <a:t>11/24/2023</a:t>
             </a:fld>
             <a:endParaRPr lang="en-US"/>
           </a:p>
@@ -4042,7 +1138,7 @@
           <a:p>
             <a:fld id="{A9AE9797-A1F7-4672-94D1-D234AB59CDFE}" type="datetimeFigureOut">
               <a:rPr lang="en-US" smtClean="0"/>
-              <a:t>11/1/2023</a:t>
+              <a:t>11/24/2023</a:t>
             </a:fld>
             <a:endParaRPr lang="en-US"/>
           </a:p>
@@ -4307,7 +1403,7 @@
           <a:p>
             <a:fld id="{A9AE9797-A1F7-4672-94D1-D234AB59CDFE}" type="datetimeFigureOut">
               <a:rPr lang="en-US" smtClean="0"/>
-              <a:t>11/1/2023</a:t>
+              <a:t>11/24/2023</a:t>
             </a:fld>
             <a:endParaRPr lang="en-US"/>
           </a:p>
@@ -4719,7 +1815,7 @@
           <a:p>
             <a:fld id="{A9AE9797-A1F7-4672-94D1-D234AB59CDFE}" type="datetimeFigureOut">
               <a:rPr lang="en-US" smtClean="0"/>
-              <a:t>11/1/2023</a:t>
+              <a:t>11/24/2023</a:t>
             </a:fld>
             <a:endParaRPr lang="en-US"/>
           </a:p>
@@ -4860,7 +1956,7 @@
           <a:p>
             <a:fld id="{A9AE9797-A1F7-4672-94D1-D234AB59CDFE}" type="datetimeFigureOut">
               <a:rPr lang="en-US" smtClean="0"/>
-              <a:t>11/1/2023</a:t>
+              <a:t>11/24/2023</a:t>
             </a:fld>
             <a:endParaRPr lang="en-US"/>
           </a:p>
@@ -4973,7 +2069,7 @@
           <a:p>
             <a:fld id="{A9AE9797-A1F7-4672-94D1-D234AB59CDFE}" type="datetimeFigureOut">
               <a:rPr lang="en-US" smtClean="0"/>
-              <a:t>11/1/2023</a:t>
+              <a:t>11/24/2023</a:t>
             </a:fld>
             <a:endParaRPr lang="en-US"/>
           </a:p>
@@ -5284,7 +2380,7 @@
           <a:p>
             <a:fld id="{A9AE9797-A1F7-4672-94D1-D234AB59CDFE}" type="datetimeFigureOut">
               <a:rPr lang="en-US" smtClean="0"/>
-              <a:t>11/1/2023</a:t>
+              <a:t>11/24/2023</a:t>
             </a:fld>
             <a:endParaRPr lang="en-US"/>
           </a:p>
@@ -5572,7 +2668,7 @@
           <a:p>
             <a:fld id="{A9AE9797-A1F7-4672-94D1-D234AB59CDFE}" type="datetimeFigureOut">
               <a:rPr lang="en-US" smtClean="0"/>
-              <a:t>11/1/2023</a:t>
+              <a:t>11/24/2023</a:t>
             </a:fld>
             <a:endParaRPr lang="en-US"/>
           </a:p>
@@ -5813,7 +2909,7 @@
           <a:p>
             <a:fld id="{A9AE9797-A1F7-4672-94D1-D234AB59CDFE}" type="datetimeFigureOut">
               <a:rPr lang="en-US" smtClean="0"/>
-              <a:t>11/1/2023</a:t>
+              <a:t>11/24/2023</a:t>
             </a:fld>
             <a:endParaRPr lang="en-US"/>
           </a:p>
@@ -6244,8 +3340,8 @@
         </p:nvSpPr>
         <p:spPr>
           <a:xfrm>
-            <a:off x="2032000" y="3211661"/>
-            <a:ext cx="1313051" cy="434675"/>
+            <a:off x="2032000" y="2514601"/>
+            <a:ext cx="1313051" cy="1131736"/>
           </a:xfrm>
           <a:custGeom>
             <a:avLst/>
@@ -6366,7 +3462,7 @@
               <a:buNone/>
             </a:pPr>
             <a:r>
-              <a:rPr lang="en-US" sz="1000" b="1" kern="1200" baseline="0" dirty="0"/>
+              <a:rPr lang="en-US" sz="1600" b="1" kern="1200" baseline="0" dirty="0"/>
               <a:t>Idea</a:t>
             </a:r>
           </a:p>
@@ -6386,8 +3482,8 @@
         </p:nvSpPr>
         <p:spPr>
           <a:xfrm>
-            <a:off x="3175000" y="3211661"/>
-            <a:ext cx="1313051" cy="434675"/>
+            <a:off x="3175000" y="2514601"/>
+            <a:ext cx="1313051" cy="1131736"/>
           </a:xfrm>
           <a:custGeom>
             <a:avLst/>
@@ -6508,7 +3604,7 @@
               <a:buNone/>
             </a:pPr>
             <a:r>
-              <a:rPr lang="en-US" sz="1000" b="1" kern="1200" baseline="0" dirty="0"/>
+              <a:rPr lang="en-US" sz="1600" b="1" kern="1200" baseline="0" dirty="0"/>
               <a:t>Draft</a:t>
             </a:r>
           </a:p>
@@ -6528,8 +3624,8 @@
         </p:nvSpPr>
         <p:spPr>
           <a:xfrm>
-            <a:off x="4318000" y="3211661"/>
-            <a:ext cx="1313051" cy="434675"/>
+            <a:off x="4318000" y="2514601"/>
+            <a:ext cx="1313051" cy="1131736"/>
           </a:xfrm>
           <a:custGeom>
             <a:avLst/>
@@ -6650,7 +3746,7 @@
               <a:buNone/>
             </a:pPr>
             <a:r>
-              <a:rPr lang="en-US" sz="1000" b="1" kern="1200" baseline="0" dirty="0"/>
+              <a:rPr lang="en-US" sz="1600" b="1" kern="1200" baseline="0" dirty="0"/>
               <a:t>Review</a:t>
             </a:r>
           </a:p>
@@ -6670,8 +3766,8 @@
         </p:nvSpPr>
         <p:spPr>
           <a:xfrm>
-            <a:off x="5461000" y="3211661"/>
-            <a:ext cx="1313051" cy="434675"/>
+            <a:off x="5461000" y="2514601"/>
+            <a:ext cx="1313051" cy="1131736"/>
           </a:xfrm>
           <a:custGeom>
             <a:avLst/>
@@ -6792,7 +3888,7 @@
               <a:buNone/>
             </a:pPr>
             <a:r>
-              <a:rPr lang="en-US" sz="1000" b="1" kern="1200" baseline="0" dirty="0"/>
+              <a:rPr lang="en-US" sz="1600" b="1" kern="1200" baseline="0" dirty="0"/>
               <a:t>Last Call</a:t>
             </a:r>
           </a:p>
@@ -6812,8 +3908,8 @@
         </p:nvSpPr>
         <p:spPr>
           <a:xfrm>
-            <a:off x="6604000" y="3211661"/>
-            <a:ext cx="1313051" cy="434675"/>
+            <a:off x="6604000" y="2514601"/>
+            <a:ext cx="1313051" cy="1131736"/>
           </a:xfrm>
           <a:custGeom>
             <a:avLst/>
@@ -6934,7 +4030,7 @@
               <a:buNone/>
             </a:pPr>
             <a:r>
-              <a:rPr lang="en-US" sz="1000" b="1" kern="1200" baseline="0" dirty="0"/>
+              <a:rPr lang="en-US" sz="1600" b="1" kern="1200" baseline="0" dirty="0"/>
               <a:t>Final</a:t>
             </a:r>
           </a:p>
@@ -6954,8 +4050,8 @@
         </p:nvSpPr>
         <p:spPr>
           <a:xfrm>
-            <a:off x="7747000" y="3211661"/>
-            <a:ext cx="1313051" cy="434675"/>
+            <a:off x="7747000" y="2514601"/>
+            <a:ext cx="1313051" cy="1131736"/>
           </a:xfrm>
           <a:custGeom>
             <a:avLst/>
@@ -7076,7 +4172,7 @@
               <a:buNone/>
             </a:pPr>
             <a:r>
-              <a:rPr lang="en-US" sz="1000" b="1" kern="1200" baseline="0" dirty="0"/>
+              <a:rPr lang="en-US" sz="1600" b="1" kern="1200" baseline="0" dirty="0"/>
               <a:t>Client Implementation</a:t>
             </a:r>
           </a:p>
@@ -7096,8 +4192,8 @@
         </p:nvSpPr>
         <p:spPr>
           <a:xfrm>
-            <a:off x="8890000" y="3211661"/>
-            <a:ext cx="1313051" cy="434675"/>
+            <a:off x="8890000" y="2514601"/>
+            <a:ext cx="1313051" cy="1131736"/>
           </a:xfrm>
           <a:custGeom>
             <a:avLst/>
@@ -7218,7 +4314,7 @@
               <a:buNone/>
             </a:pPr>
             <a:r>
-              <a:rPr lang="en-US" sz="1000" b="1" kern="1200" baseline="0" dirty="0"/>
+              <a:rPr lang="en-US" sz="1600" b="1" kern="1200" baseline="0" dirty="0"/>
               <a:t>Adoption</a:t>
             </a:r>
           </a:p>
@@ -7238,12 +4334,15 @@
         </p:nvSpPr>
         <p:spPr>
           <a:xfrm>
-            <a:off x="3438077" y="4113264"/>
-            <a:ext cx="1148631" cy="499992"/>
+            <a:off x="3438077" y="4113263"/>
+            <a:ext cx="1313051" cy="777143"/>
           </a:xfrm>
           <a:prstGeom prst="roundRect">
             <a:avLst/>
           </a:prstGeom>
+          <a:solidFill>
+            <a:srgbClr val="FF0000"/>
+          </a:solidFill>
         </p:spPr>
         <p:style>
           <a:lnRef idx="2">
@@ -7267,7 +4366,7 @@
           <a:p>
             <a:pPr algn="ctr"/>
             <a:r>
-              <a:rPr lang="en-US" sz="1000" b="1" dirty="0"/>
+              <a:rPr lang="en-US" sz="1600" b="1" dirty="0"/>
               <a:t>Stagnant</a:t>
             </a:r>
           </a:p>
@@ -7287,12 +4386,15 @@
         </p:nvSpPr>
         <p:spPr>
           <a:xfrm>
-            <a:off x="5130993" y="4113264"/>
-            <a:ext cx="1148631" cy="499992"/>
+            <a:off x="5130993" y="4113263"/>
+            <a:ext cx="1313051" cy="777143"/>
           </a:xfrm>
           <a:prstGeom prst="roundRect">
             <a:avLst/>
           </a:prstGeom>
+          <a:solidFill>
+            <a:srgbClr val="FF0000"/>
+          </a:solidFill>
         </p:spPr>
         <p:style>
           <a:lnRef idx="2">
@@ -7316,7 +4418,7 @@
           <a:p>
             <a:pPr algn="ctr"/>
             <a:r>
-              <a:rPr lang="en-US" sz="1000" b="1" dirty="0"/>
+              <a:rPr lang="en-US" sz="1600" b="1" dirty="0"/>
               <a:t>Withdrawn</a:t>
             </a:r>
           </a:p>
@@ -7340,7 +4442,7 @@
         <p:spPr>
           <a:xfrm>
             <a:off x="3773715" y="3646336"/>
-            <a:ext cx="238678" cy="466928"/>
+            <a:ext cx="320888" cy="466927"/>
           </a:xfrm>
           <a:prstGeom prst="straightConnector1">
             <a:avLst/>
@@ -7382,7 +4484,7 @@
         <p:spPr>
           <a:xfrm>
             <a:off x="3766122" y="3646336"/>
-            <a:ext cx="1939187" cy="466928"/>
+            <a:ext cx="2021397" cy="466927"/>
           </a:xfrm>
           <a:prstGeom prst="straightConnector1">
             <a:avLst/>
@@ -7423,8 +4525,8 @@
         </p:nvCxnSpPr>
         <p:spPr>
           <a:xfrm flipH="1">
-            <a:off x="4012393" y="3646336"/>
-            <a:ext cx="904322" cy="466928"/>
+            <a:off x="4094603" y="3646336"/>
+            <a:ext cx="822112" cy="466927"/>
           </a:xfrm>
           <a:prstGeom prst="straightConnector1">
             <a:avLst/>
@@ -7466,7 +4568,7 @@
         <p:spPr>
           <a:xfrm>
             <a:off x="4909122" y="3646336"/>
-            <a:ext cx="796187" cy="466928"/>
+            <a:ext cx="878397" cy="466927"/>
           </a:xfrm>
           <a:prstGeom prst="straightConnector1">
             <a:avLst/>
@@ -7507,8 +4609,8 @@
         </p:nvCxnSpPr>
         <p:spPr>
           <a:xfrm flipH="1">
-            <a:off x="4012393" y="3646336"/>
-            <a:ext cx="2064216" cy="466928"/>
+            <a:off x="4094603" y="3646336"/>
+            <a:ext cx="1982006" cy="466927"/>
           </a:xfrm>
           <a:prstGeom prst="straightConnector1">
             <a:avLst/>
@@ -7549,8 +4651,8 @@
         </p:nvCxnSpPr>
         <p:spPr>
           <a:xfrm flipH="1">
-            <a:off x="5705309" y="3646336"/>
-            <a:ext cx="363708" cy="466928"/>
+            <a:off x="5787519" y="3646336"/>
+            <a:ext cx="281498" cy="466927"/>
           </a:xfrm>
           <a:prstGeom prst="straightConnector1">
             <a:avLst/>
@@ -7588,7 +4690,7 @@
         </p:nvSpPr>
         <p:spPr>
           <a:xfrm rot="5400000">
-            <a:off x="4742267" y="112945"/>
+            <a:off x="4725939" y="-540199"/>
             <a:ext cx="294468" cy="5715001"/>
           </a:xfrm>
           <a:prstGeom prst="leftBrace">
@@ -7632,8 +4734,8 @@
         </p:nvSpPr>
         <p:spPr>
           <a:xfrm>
-            <a:off x="3479155" y="2567548"/>
-            <a:ext cx="2820691" cy="246221"/>
+            <a:off x="3462827" y="1816436"/>
+            <a:ext cx="2820691" cy="338554"/>
           </a:xfrm>
           <a:prstGeom prst="rect">
             <a:avLst/>
@@ -7648,8 +4750,8 @@
           <a:p>
             <a:pPr algn="ctr"/>
             <a:r>
-              <a:rPr lang="en-US" sz="1000" b="1" dirty="0"/>
-              <a:t>EIP Development</a:t>
+              <a:rPr lang="en-US" sz="1600" b="1" dirty="0"/>
+              <a:t>EIP Discussion</a:t>
             </a:r>
           </a:p>
         </p:txBody>
@@ -7658,64 +4760,6 @@
     <p:extLst>
       <p:ext uri="{BB962C8B-B14F-4D97-AF65-F5344CB8AC3E}">
         <p14:creationId xmlns:p14="http://schemas.microsoft.com/office/powerpoint/2010/main" val="2333721486"/>
-      </p:ext>
-    </p:extLst>
-  </p:cSld>
-  <p:clrMapOvr>
-    <a:masterClrMapping/>
-  </p:clrMapOvr>
-</p:sld>
-</file>
-
-<file path=ppt/slides/slide2.xml><?xml version="1.0" encoding="utf-8"?>
-<p:sld xmlns:a="http://schemas.openxmlformats.org/drawingml/2006/main" xmlns:r="http://schemas.openxmlformats.org/officeDocument/2006/relationships" xmlns:p="http://schemas.openxmlformats.org/presentationml/2006/main">
-  <p:cSld>
-    <p:spTree>
-      <p:nvGrpSpPr>
-        <p:cNvPr id="1" name=""/>
-        <p:cNvGrpSpPr/>
-        <p:nvPr/>
-      </p:nvGrpSpPr>
-      <p:grpSpPr>
-        <a:xfrm>
-          <a:off x="0" y="0"/>
-          <a:ext cx="0" cy="0"/>
-          <a:chOff x="0" y="0"/>
-          <a:chExt cx="0" cy="0"/>
-        </a:xfrm>
-      </p:grpSpPr>
-      <p:graphicFrame>
-        <p:nvGraphicFramePr>
-          <p:cNvPr id="3" name="Diagram 2">
-            <a:extLst>
-              <a:ext uri="{FF2B5EF4-FFF2-40B4-BE49-F238E27FC236}">
-                <a16:creationId xmlns:a16="http://schemas.microsoft.com/office/drawing/2014/main" id="{AA71C01A-7C4B-479A-9881-E759A604B0FE}"/>
-              </a:ext>
-            </a:extLst>
-          </p:cNvPr>
-          <p:cNvGraphicFramePr/>
-          <p:nvPr>
-            <p:extLst>
-              <p:ext uri="{D42A27DB-BD31-4B8C-83A1-F6EECF244321}">
-                <p14:modId xmlns:p14="http://schemas.microsoft.com/office/powerpoint/2010/main" val="3181894465"/>
-              </p:ext>
-            </p:extLst>
-          </p:nvPr>
-        </p:nvGraphicFramePr>
-        <p:xfrm>
-          <a:off x="2032000" y="719666"/>
-          <a:ext cx="8128000" cy="5418667"/>
-        </p:xfrm>
-        <a:graphic>
-          <a:graphicData uri="http://schemas.openxmlformats.org/drawingml/2006/diagram">
-            <dgm:relIds xmlns:dgm="http://schemas.openxmlformats.org/drawingml/2006/diagram" xmlns:r="http://schemas.openxmlformats.org/officeDocument/2006/relationships" r:dm="rId2" r:lo="rId3" r:qs="rId4" r:cs="rId5"/>
-          </a:graphicData>
-        </a:graphic>
-      </p:graphicFrame>
-    </p:spTree>
-    <p:extLst>
-      <p:ext uri="{BB962C8B-B14F-4D97-AF65-F5344CB8AC3E}">
-        <p14:creationId xmlns:p14="http://schemas.microsoft.com/office/powerpoint/2010/main" val="2238273340"/>
       </p:ext>
     </p:extLst>
   </p:cSld>

</xml_diff>